<commit_message>
docs: add initial presentation for first review
</commit_message>
<xml_diff>
--- a/Docs/Ppt/First Review.pptx
+++ b/Docs/Ppt/First Review.pptx
@@ -4,19 +4,26 @@
   <p:sldMasterIdLst>
     <p:sldMasterId id="2147483648" r:id="rId1"/>
   </p:sldMasterIdLst>
+  <p:notesMasterIdLst>
+    <p:notesMasterId r:id="rId18"/>
+  </p:notesMasterIdLst>
   <p:sldIdLst>
     <p:sldId id="257" r:id="rId2"/>
     <p:sldId id="275" r:id="rId3"/>
-    <p:sldId id="274" r:id="rId4"/>
-    <p:sldId id="273" r:id="rId5"/>
-    <p:sldId id="276" r:id="rId6"/>
-    <p:sldId id="277" r:id="rId7"/>
-    <p:sldId id="269" r:id="rId8"/>
-    <p:sldId id="270" r:id="rId9"/>
-    <p:sldId id="271" r:id="rId10"/>
-    <p:sldId id="272" r:id="rId11"/>
-    <p:sldId id="278" r:id="rId12"/>
-    <p:sldId id="279" r:id="rId13"/>
+    <p:sldId id="276" r:id="rId4"/>
+    <p:sldId id="277" r:id="rId5"/>
+    <p:sldId id="287" r:id="rId6"/>
+    <p:sldId id="280" r:id="rId7"/>
+    <p:sldId id="282" r:id="rId8"/>
+    <p:sldId id="283" r:id="rId9"/>
+    <p:sldId id="286" r:id="rId10"/>
+    <p:sldId id="284" r:id="rId11"/>
+    <p:sldId id="285" r:id="rId12"/>
+    <p:sldId id="270" r:id="rId13"/>
+    <p:sldId id="271" r:id="rId14"/>
+    <p:sldId id="272" r:id="rId15"/>
+    <p:sldId id="278" r:id="rId16"/>
+    <p:sldId id="279" r:id="rId17"/>
   </p:sldIdLst>
   <p:sldSz cx="9144000" cy="6858000" type="screen4x3"/>
   <p:notesSz cx="6858000" cy="9144000"/>
@@ -134,6 +141,440 @@
 </p:presentation>
 </file>
 
+<file path=ppt/notesMasters/notesMaster1.xml><?xml version="1.0" encoding="utf-8"?>
+<p:notesMaster xmlns:a="http://schemas.openxmlformats.org/drawingml/2006/main" xmlns:r="http://schemas.openxmlformats.org/officeDocument/2006/relationships" xmlns:p="http://schemas.openxmlformats.org/presentationml/2006/main">
+  <p:cSld>
+    <p:bg>
+      <p:bgRef idx="1001">
+        <a:schemeClr val="bg1"/>
+      </p:bgRef>
+    </p:bg>
+    <p:spTree>
+      <p:nvGrpSpPr>
+        <p:cNvPr id="1" name=""/>
+        <p:cNvGrpSpPr/>
+        <p:nvPr/>
+      </p:nvGrpSpPr>
+      <p:grpSpPr>
+        <a:xfrm>
+          <a:off x="0" y="0"/>
+          <a:ext cx="0" cy="0"/>
+          <a:chOff x="0" y="0"/>
+          <a:chExt cx="0" cy="0"/>
+        </a:xfrm>
+      </p:grpSpPr>
+      <p:sp>
+        <p:nvSpPr>
+          <p:cNvPr id="2" name="Header Placeholder 1"/>
+          <p:cNvSpPr>
+            <a:spLocks noGrp="1"/>
+          </p:cNvSpPr>
+          <p:nvPr>
+            <p:ph type="hdr" sz="quarter"/>
+          </p:nvPr>
+        </p:nvSpPr>
+        <p:spPr>
+          <a:xfrm>
+            <a:off x="0" y="0"/>
+            <a:ext cx="2971800" cy="458788"/>
+          </a:xfrm>
+          <a:prstGeom prst="rect">
+            <a:avLst/>
+          </a:prstGeom>
+        </p:spPr>
+        <p:txBody>
+          <a:bodyPr vert="horz" lIns="91440" tIns="45720" rIns="91440" bIns="45720" rtlCol="0"/>
+          <a:lstStyle>
+            <a:lvl1pPr algn="l">
+              <a:defRPr sz="1200"/>
+            </a:lvl1pPr>
+          </a:lstStyle>
+          <a:p>
+            <a:endParaRPr lang="en-US"/>
+          </a:p>
+        </p:txBody>
+      </p:sp>
+      <p:sp>
+        <p:nvSpPr>
+          <p:cNvPr id="3" name="Date Placeholder 2"/>
+          <p:cNvSpPr>
+            <a:spLocks noGrp="1"/>
+          </p:cNvSpPr>
+          <p:nvPr>
+            <p:ph type="dt" idx="1"/>
+          </p:nvPr>
+        </p:nvSpPr>
+        <p:spPr>
+          <a:xfrm>
+            <a:off x="3884613" y="0"/>
+            <a:ext cx="2971800" cy="458788"/>
+          </a:xfrm>
+          <a:prstGeom prst="rect">
+            <a:avLst/>
+          </a:prstGeom>
+        </p:spPr>
+        <p:txBody>
+          <a:bodyPr vert="horz" lIns="91440" tIns="45720" rIns="91440" bIns="45720" rtlCol="0"/>
+          <a:lstStyle>
+            <a:lvl1pPr algn="r">
+              <a:defRPr sz="1200"/>
+            </a:lvl1pPr>
+          </a:lstStyle>
+          <a:p>
+            <a:fld id="{53462338-1B9E-4EA2-9152-193F6A0ADA53}" type="datetimeFigureOut">
+              <a:rPr lang="en-US" smtClean="0"/>
+              <a:t>12/10/2025</a:t>
+            </a:fld>
+            <a:endParaRPr lang="en-US"/>
+          </a:p>
+        </p:txBody>
+      </p:sp>
+      <p:sp>
+        <p:nvSpPr>
+          <p:cNvPr id="4" name="Slide Image Placeholder 3"/>
+          <p:cNvSpPr>
+            <a:spLocks noGrp="1" noRot="1" noChangeAspect="1"/>
+          </p:cNvSpPr>
+          <p:nvPr>
+            <p:ph type="sldImg" idx="2"/>
+          </p:nvPr>
+        </p:nvSpPr>
+        <p:spPr>
+          <a:xfrm>
+            <a:off x="1371600" y="1143000"/>
+            <a:ext cx="4114800" cy="3086100"/>
+          </a:xfrm>
+          <a:prstGeom prst="rect">
+            <a:avLst/>
+          </a:prstGeom>
+          <a:noFill/>
+          <a:ln w="12700">
+            <a:solidFill>
+              <a:prstClr val="black"/>
+            </a:solidFill>
+          </a:ln>
+        </p:spPr>
+        <p:txBody>
+          <a:bodyPr vert="horz" lIns="91440" tIns="45720" rIns="91440" bIns="45720" rtlCol="0" anchor="ctr"/>
+          <a:lstStyle/>
+          <a:p>
+            <a:endParaRPr lang="en-US"/>
+          </a:p>
+        </p:txBody>
+      </p:sp>
+      <p:sp>
+        <p:nvSpPr>
+          <p:cNvPr id="5" name="Notes Placeholder 4"/>
+          <p:cNvSpPr>
+            <a:spLocks noGrp="1"/>
+          </p:cNvSpPr>
+          <p:nvPr>
+            <p:ph type="body" sz="quarter" idx="3"/>
+          </p:nvPr>
+        </p:nvSpPr>
+        <p:spPr>
+          <a:xfrm>
+            <a:off x="685800" y="4400550"/>
+            <a:ext cx="5486400" cy="3600450"/>
+          </a:xfrm>
+          <a:prstGeom prst="rect">
+            <a:avLst/>
+          </a:prstGeom>
+        </p:spPr>
+        <p:txBody>
+          <a:bodyPr vert="horz" lIns="91440" tIns="45720" rIns="91440" bIns="45720" rtlCol="0"/>
+          <a:lstStyle/>
+          <a:p>
+            <a:pPr lvl="0"/>
+            <a:r>
+              <a:rPr lang="en-GB"/>
+              <a:t>Click to edit Master text styles</a:t>
+            </a:r>
+          </a:p>
+          <a:p>
+            <a:pPr lvl="1"/>
+            <a:r>
+              <a:rPr lang="en-GB"/>
+              <a:t>Second level</a:t>
+            </a:r>
+          </a:p>
+          <a:p>
+            <a:pPr lvl="2"/>
+            <a:r>
+              <a:rPr lang="en-GB"/>
+              <a:t>Third level</a:t>
+            </a:r>
+          </a:p>
+          <a:p>
+            <a:pPr lvl="3"/>
+            <a:r>
+              <a:rPr lang="en-GB"/>
+              <a:t>Fourth level</a:t>
+            </a:r>
+          </a:p>
+          <a:p>
+            <a:pPr lvl="4"/>
+            <a:r>
+              <a:rPr lang="en-GB"/>
+              <a:t>Fifth level</a:t>
+            </a:r>
+            <a:endParaRPr lang="en-US"/>
+          </a:p>
+        </p:txBody>
+      </p:sp>
+      <p:sp>
+        <p:nvSpPr>
+          <p:cNvPr id="6" name="Footer Placeholder 5"/>
+          <p:cNvSpPr>
+            <a:spLocks noGrp="1"/>
+          </p:cNvSpPr>
+          <p:nvPr>
+            <p:ph type="ftr" sz="quarter" idx="4"/>
+          </p:nvPr>
+        </p:nvSpPr>
+        <p:spPr>
+          <a:xfrm>
+            <a:off x="0" y="8685213"/>
+            <a:ext cx="2971800" cy="458787"/>
+          </a:xfrm>
+          <a:prstGeom prst="rect">
+            <a:avLst/>
+          </a:prstGeom>
+        </p:spPr>
+        <p:txBody>
+          <a:bodyPr vert="horz" lIns="91440" tIns="45720" rIns="91440" bIns="45720" rtlCol="0" anchor="b"/>
+          <a:lstStyle>
+            <a:lvl1pPr algn="l">
+              <a:defRPr sz="1200"/>
+            </a:lvl1pPr>
+          </a:lstStyle>
+          <a:p>
+            <a:endParaRPr lang="en-US"/>
+          </a:p>
+        </p:txBody>
+      </p:sp>
+      <p:sp>
+        <p:nvSpPr>
+          <p:cNvPr id="7" name="Slide Number Placeholder 6"/>
+          <p:cNvSpPr>
+            <a:spLocks noGrp="1"/>
+          </p:cNvSpPr>
+          <p:nvPr>
+            <p:ph type="sldNum" sz="quarter" idx="5"/>
+          </p:nvPr>
+        </p:nvSpPr>
+        <p:spPr>
+          <a:xfrm>
+            <a:off x="3884613" y="8685213"/>
+            <a:ext cx="2971800" cy="458787"/>
+          </a:xfrm>
+          <a:prstGeom prst="rect">
+            <a:avLst/>
+          </a:prstGeom>
+        </p:spPr>
+        <p:txBody>
+          <a:bodyPr vert="horz" lIns="91440" tIns="45720" rIns="91440" bIns="45720" rtlCol="0" anchor="b"/>
+          <a:lstStyle>
+            <a:lvl1pPr algn="r">
+              <a:defRPr sz="1200"/>
+            </a:lvl1pPr>
+          </a:lstStyle>
+          <a:p>
+            <a:fld id="{D8532E4A-F7AE-4D29-88CE-126133FD1B1F}" type="slidenum">
+              <a:rPr lang="en-US" smtClean="0"/>
+              <a:t>‹#›</a:t>
+            </a:fld>
+            <a:endParaRPr lang="en-US"/>
+          </a:p>
+        </p:txBody>
+      </p:sp>
+    </p:spTree>
+    <p:extLst>
+      <p:ext uri="{BB962C8B-B14F-4D97-AF65-F5344CB8AC3E}">
+        <p14:creationId xmlns:p14="http://schemas.microsoft.com/office/powerpoint/2010/main" val="329068874"/>
+      </p:ext>
+    </p:extLst>
+  </p:cSld>
+  <p:clrMap bg1="lt1" tx1="dk1" bg2="lt2" tx2="dk2" accent1="accent1" accent2="accent2" accent3="accent3" accent4="accent4" accent5="accent5" accent6="accent6" hlink="hlink" folHlink="folHlink"/>
+  <p:notesStyle>
+    <a:lvl1pPr marL="0" algn="l" defTabSz="914400" rtl="0" eaLnBrk="1" latinLnBrk="0" hangingPunct="1">
+      <a:defRPr sz="1200" kern="1200">
+        <a:solidFill>
+          <a:schemeClr val="tx1"/>
+        </a:solidFill>
+        <a:latin typeface="+mn-lt"/>
+        <a:ea typeface="+mn-ea"/>
+        <a:cs typeface="+mn-cs"/>
+      </a:defRPr>
+    </a:lvl1pPr>
+    <a:lvl2pPr marL="457200" algn="l" defTabSz="914400" rtl="0" eaLnBrk="1" latinLnBrk="0" hangingPunct="1">
+      <a:defRPr sz="1200" kern="1200">
+        <a:solidFill>
+          <a:schemeClr val="tx1"/>
+        </a:solidFill>
+        <a:latin typeface="+mn-lt"/>
+        <a:ea typeface="+mn-ea"/>
+        <a:cs typeface="+mn-cs"/>
+      </a:defRPr>
+    </a:lvl2pPr>
+    <a:lvl3pPr marL="914400" algn="l" defTabSz="914400" rtl="0" eaLnBrk="1" latinLnBrk="0" hangingPunct="1">
+      <a:defRPr sz="1200" kern="1200">
+        <a:solidFill>
+          <a:schemeClr val="tx1"/>
+        </a:solidFill>
+        <a:latin typeface="+mn-lt"/>
+        <a:ea typeface="+mn-ea"/>
+        <a:cs typeface="+mn-cs"/>
+      </a:defRPr>
+    </a:lvl3pPr>
+    <a:lvl4pPr marL="1371600" algn="l" defTabSz="914400" rtl="0" eaLnBrk="1" latinLnBrk="0" hangingPunct="1">
+      <a:defRPr sz="1200" kern="1200">
+        <a:solidFill>
+          <a:schemeClr val="tx1"/>
+        </a:solidFill>
+        <a:latin typeface="+mn-lt"/>
+        <a:ea typeface="+mn-ea"/>
+        <a:cs typeface="+mn-cs"/>
+      </a:defRPr>
+    </a:lvl4pPr>
+    <a:lvl5pPr marL="1828800" algn="l" defTabSz="914400" rtl="0" eaLnBrk="1" latinLnBrk="0" hangingPunct="1">
+      <a:defRPr sz="1200" kern="1200">
+        <a:solidFill>
+          <a:schemeClr val="tx1"/>
+        </a:solidFill>
+        <a:latin typeface="+mn-lt"/>
+        <a:ea typeface="+mn-ea"/>
+        <a:cs typeface="+mn-cs"/>
+      </a:defRPr>
+    </a:lvl5pPr>
+    <a:lvl6pPr marL="2286000" algn="l" defTabSz="914400" rtl="0" eaLnBrk="1" latinLnBrk="0" hangingPunct="1">
+      <a:defRPr sz="1200" kern="1200">
+        <a:solidFill>
+          <a:schemeClr val="tx1"/>
+        </a:solidFill>
+        <a:latin typeface="+mn-lt"/>
+        <a:ea typeface="+mn-ea"/>
+        <a:cs typeface="+mn-cs"/>
+      </a:defRPr>
+    </a:lvl6pPr>
+    <a:lvl7pPr marL="2743200" algn="l" defTabSz="914400" rtl="0" eaLnBrk="1" latinLnBrk="0" hangingPunct="1">
+      <a:defRPr sz="1200" kern="1200">
+        <a:solidFill>
+          <a:schemeClr val="tx1"/>
+        </a:solidFill>
+        <a:latin typeface="+mn-lt"/>
+        <a:ea typeface="+mn-ea"/>
+        <a:cs typeface="+mn-cs"/>
+      </a:defRPr>
+    </a:lvl7pPr>
+    <a:lvl8pPr marL="3200400" algn="l" defTabSz="914400" rtl="0" eaLnBrk="1" latinLnBrk="0" hangingPunct="1">
+      <a:defRPr sz="1200" kern="1200">
+        <a:solidFill>
+          <a:schemeClr val="tx1"/>
+        </a:solidFill>
+        <a:latin typeface="+mn-lt"/>
+        <a:ea typeface="+mn-ea"/>
+        <a:cs typeface="+mn-cs"/>
+      </a:defRPr>
+    </a:lvl8pPr>
+    <a:lvl9pPr marL="3657600" algn="l" defTabSz="914400" rtl="0" eaLnBrk="1" latinLnBrk="0" hangingPunct="1">
+      <a:defRPr sz="1200" kern="1200">
+        <a:solidFill>
+          <a:schemeClr val="tx1"/>
+        </a:solidFill>
+        <a:latin typeface="+mn-lt"/>
+        <a:ea typeface="+mn-ea"/>
+        <a:cs typeface="+mn-cs"/>
+      </a:defRPr>
+    </a:lvl9pPr>
+  </p:notesStyle>
+</p:notesMaster>
+</file>
+
+<file path=ppt/notesSlides/notesSlide1.xml><?xml version="1.0" encoding="utf-8"?>
+<p:notes xmlns:a="http://schemas.openxmlformats.org/drawingml/2006/main" xmlns:r="http://schemas.openxmlformats.org/officeDocument/2006/relationships" xmlns:p="http://schemas.openxmlformats.org/presentationml/2006/main">
+  <p:cSld>
+    <p:spTree>
+      <p:nvGrpSpPr>
+        <p:cNvPr id="1" name=""/>
+        <p:cNvGrpSpPr/>
+        <p:nvPr/>
+      </p:nvGrpSpPr>
+      <p:grpSpPr>
+        <a:xfrm>
+          <a:off x="0" y="0"/>
+          <a:ext cx="0" cy="0"/>
+          <a:chOff x="0" y="0"/>
+          <a:chExt cx="0" cy="0"/>
+        </a:xfrm>
+      </p:grpSpPr>
+      <p:sp>
+        <p:nvSpPr>
+          <p:cNvPr id="2" name="Slide Image Placeholder 1"/>
+          <p:cNvSpPr>
+            <a:spLocks noGrp="1" noRot="1" noChangeAspect="1"/>
+          </p:cNvSpPr>
+          <p:nvPr>
+            <p:ph type="sldImg"/>
+          </p:nvPr>
+        </p:nvSpPr>
+        <p:spPr/>
+      </p:sp>
+      <p:sp>
+        <p:nvSpPr>
+          <p:cNvPr id="3" name="Notes Placeholder 2"/>
+          <p:cNvSpPr>
+            <a:spLocks noGrp="1"/>
+          </p:cNvSpPr>
+          <p:nvPr>
+            <p:ph type="body" idx="1"/>
+          </p:nvPr>
+        </p:nvSpPr>
+        <p:spPr/>
+        <p:txBody>
+          <a:bodyPr/>
+          <a:lstStyle/>
+          <a:p>
+            <a:endParaRPr lang="en-US" dirty="0"/>
+          </a:p>
+        </p:txBody>
+      </p:sp>
+      <p:sp>
+        <p:nvSpPr>
+          <p:cNvPr id="4" name="Slide Number Placeholder 3"/>
+          <p:cNvSpPr>
+            <a:spLocks noGrp="1"/>
+          </p:cNvSpPr>
+          <p:nvPr>
+            <p:ph type="sldNum" sz="quarter" idx="5"/>
+          </p:nvPr>
+        </p:nvSpPr>
+        <p:spPr/>
+        <p:txBody>
+          <a:bodyPr/>
+          <a:lstStyle/>
+          <a:p>
+            <a:fld id="{D8532E4A-F7AE-4D29-88CE-126133FD1B1F}" type="slidenum">
+              <a:rPr lang="en-US" smtClean="0"/>
+              <a:t>10</a:t>
+            </a:fld>
+            <a:endParaRPr lang="en-US"/>
+          </a:p>
+        </p:txBody>
+      </p:sp>
+    </p:spTree>
+    <p:extLst>
+      <p:ext uri="{BB962C8B-B14F-4D97-AF65-F5344CB8AC3E}">
+        <p14:creationId xmlns:p14="http://schemas.microsoft.com/office/powerpoint/2010/main" val="434062631"/>
+      </p:ext>
+    </p:extLst>
+  </p:cSld>
+  <p:clrMapOvr>
+    <a:masterClrMapping/>
+  </p:clrMapOvr>
+</p:notes>
+</file>
+
 <file path=ppt/slideLayouts/slideLayout1.xml><?xml version="1.0" encoding="utf-8"?>
 <p:sldLayout xmlns:a="http://schemas.openxmlformats.org/drawingml/2006/main" xmlns:r="http://schemas.openxmlformats.org/officeDocument/2006/relationships" xmlns:p="http://schemas.openxmlformats.org/presentationml/2006/main" type="title" preserve="1">
   <p:cSld name="Title Slide">
@@ -314,7 +755,7 @@
             <a:fld id="{1D8BD707-D9CF-40AE-B4C6-C98DA3205C09}" type="datetimeFigureOut">
               <a:rPr lang="en-US" smtClean="0"/>
               <a:pPr/>
-              <a:t>12/5/2025</a:t>
+              <a:t>12/10/2025</a:t>
             </a:fld>
             <a:endParaRPr lang="en-US"/>
           </a:p>
@@ -479,7 +920,7 @@
             <a:fld id="{1D8BD707-D9CF-40AE-B4C6-C98DA3205C09}" type="datetimeFigureOut">
               <a:rPr lang="en-US" smtClean="0"/>
               <a:pPr/>
-              <a:t>12/5/2025</a:t>
+              <a:t>12/10/2025</a:t>
             </a:fld>
             <a:endParaRPr lang="en-US"/>
           </a:p>
@@ -654,7 +1095,7 @@
             <a:fld id="{1D8BD707-D9CF-40AE-B4C6-C98DA3205C09}" type="datetimeFigureOut">
               <a:rPr lang="en-US" smtClean="0"/>
               <a:pPr/>
-              <a:t>12/5/2025</a:t>
+              <a:t>12/10/2025</a:t>
             </a:fld>
             <a:endParaRPr lang="en-US"/>
           </a:p>
@@ -819,7 +1260,7 @@
             <a:fld id="{1D8BD707-D9CF-40AE-B4C6-C98DA3205C09}" type="datetimeFigureOut">
               <a:rPr lang="en-US" smtClean="0"/>
               <a:pPr/>
-              <a:t>12/5/2025</a:t>
+              <a:t>12/10/2025</a:t>
             </a:fld>
             <a:endParaRPr lang="en-US"/>
           </a:p>
@@ -1061,7 +1502,7 @@
             <a:fld id="{1D8BD707-D9CF-40AE-B4C6-C98DA3205C09}" type="datetimeFigureOut">
               <a:rPr lang="en-US" smtClean="0"/>
               <a:pPr/>
-              <a:t>12/5/2025</a:t>
+              <a:t>12/10/2025</a:t>
             </a:fld>
             <a:endParaRPr lang="en-US"/>
           </a:p>
@@ -1343,7 +1784,7 @@
             <a:fld id="{1D8BD707-D9CF-40AE-B4C6-C98DA3205C09}" type="datetimeFigureOut">
               <a:rPr lang="en-US" smtClean="0"/>
               <a:pPr/>
-              <a:t>12/5/2025</a:t>
+              <a:t>12/10/2025</a:t>
             </a:fld>
             <a:endParaRPr lang="en-US"/>
           </a:p>
@@ -1759,7 +2200,7 @@
             <a:fld id="{1D8BD707-D9CF-40AE-B4C6-C98DA3205C09}" type="datetimeFigureOut">
               <a:rPr lang="en-US" smtClean="0"/>
               <a:pPr/>
-              <a:t>12/5/2025</a:t>
+              <a:t>12/10/2025</a:t>
             </a:fld>
             <a:endParaRPr lang="en-US"/>
           </a:p>
@@ -1873,7 +2314,7 @@
             <a:fld id="{1D8BD707-D9CF-40AE-B4C6-C98DA3205C09}" type="datetimeFigureOut">
               <a:rPr lang="en-US" smtClean="0"/>
               <a:pPr/>
-              <a:t>12/5/2025</a:t>
+              <a:t>12/10/2025</a:t>
             </a:fld>
             <a:endParaRPr lang="en-US"/>
           </a:p>
@@ -1965,7 +2406,7 @@
             <a:fld id="{1D8BD707-D9CF-40AE-B4C6-C98DA3205C09}" type="datetimeFigureOut">
               <a:rPr lang="en-US" smtClean="0"/>
               <a:pPr/>
-              <a:t>12/5/2025</a:t>
+              <a:t>12/10/2025</a:t>
             </a:fld>
             <a:endParaRPr lang="en-US"/>
           </a:p>
@@ -2237,7 +2678,7 @@
             <a:fld id="{1D8BD707-D9CF-40AE-B4C6-C98DA3205C09}" type="datetimeFigureOut">
               <a:rPr lang="en-US" smtClean="0"/>
               <a:pPr/>
-              <a:t>12/5/2025</a:t>
+              <a:t>12/10/2025</a:t>
             </a:fld>
             <a:endParaRPr lang="en-US"/>
           </a:p>
@@ -2486,7 +2927,7 @@
             <a:fld id="{1D8BD707-D9CF-40AE-B4C6-C98DA3205C09}" type="datetimeFigureOut">
               <a:rPr lang="en-US" smtClean="0"/>
               <a:pPr/>
-              <a:t>12/5/2025</a:t>
+              <a:t>12/10/2025</a:t>
             </a:fld>
             <a:endParaRPr lang="en-US"/>
           </a:p>
@@ -2694,7 +3135,7 @@
             <a:fld id="{1D8BD707-D9CF-40AE-B4C6-C98DA3205C09}" type="datetimeFigureOut">
               <a:rPr lang="en-US" smtClean="0"/>
               <a:pPr/>
-              <a:t>12/5/2025</a:t>
+              <a:t>12/10/2025</a:t>
             </a:fld>
             <a:endParaRPr lang="en-US"/>
           </a:p>
@@ -3446,7 +3887,7 @@
           <p:nvPr>
             <p:extLst>
               <p:ext uri="{D42A27DB-BD31-4B8C-83A1-F6EECF244321}">
-                <p14:modId xmlns:p14="http://schemas.microsoft.com/office/powerpoint/2010/main" val="2911068624"/>
+                <p14:modId xmlns:p14="http://schemas.microsoft.com/office/powerpoint/2010/main" val="3243016882"/>
               </p:ext>
             </p:extLst>
           </p:nvPr>
@@ -3668,18 +4109,33 @@
                       </a:endParaRPr>
                     </a:p>
                     <a:p>
-                      <a:endParaRPr lang="en-IN" dirty="0">
-                        <a:latin typeface="Times New Roman" panose="02020603050405020304" pitchFamily="18" charset="0"/>
-                        <a:cs typeface="Times New Roman" panose="02020603050405020304" pitchFamily="18" charset="0"/>
-                      </a:endParaRPr>
-                    </a:p>
-                    <a:p>
+                      <a:pPr algn="ctr"/>
                       <a:r>
                         <a:rPr lang="en-IN" dirty="0">
                           <a:latin typeface="Times New Roman" panose="02020603050405020304" pitchFamily="18" charset="0"/>
                           <a:cs typeface="Times New Roman" panose="02020603050405020304" pitchFamily="18" charset="0"/>
                         </a:rPr>
                         <a:t>B. SRINIVASULU</a:t>
+                      </a:r>
+                    </a:p>
+                    <a:p>
+                      <a:pPr algn="ctr"/>
+                      <a:r>
+                        <a:rPr lang="en-IN" dirty="0">
+                          <a:latin typeface="Times New Roman" panose="02020603050405020304" pitchFamily="18" charset="0"/>
+                          <a:cs typeface="Times New Roman" panose="02020603050405020304" pitchFamily="18" charset="0"/>
+                        </a:rPr>
+                        <a:t>M.TECH</a:t>
+                      </a:r>
+                    </a:p>
+                    <a:p>
+                      <a:pPr algn="ctr"/>
+                      <a:r>
+                        <a:rPr lang="en-IN" dirty="0">
+                          <a:latin typeface="Times New Roman" panose="02020603050405020304" pitchFamily="18" charset="0"/>
+                          <a:cs typeface="Times New Roman" panose="02020603050405020304" pitchFamily="18" charset="0"/>
+                        </a:rPr>
+                        <a:t>ASST. PROFESSOR</a:t>
                       </a:r>
                     </a:p>
                   </a:txBody>
@@ -3948,7 +4404,7 @@
           <p:cNvPr id="2" name="Title 1">
             <a:extLst>
               <a:ext uri="{FF2B5EF4-FFF2-40B4-BE49-F238E27FC236}">
-                <a16:creationId xmlns:a16="http://schemas.microsoft.com/office/drawing/2014/main" id="{D38B7F55-5740-40C5-ADF4-D0F19EC6ED0C}"/>
+                <a16:creationId xmlns:a16="http://schemas.microsoft.com/office/drawing/2014/main" id="{C76AB516-33AF-496D-B7FB-3C7AEBCCE155}"/>
               </a:ext>
             </a:extLst>
           </p:cNvPr>
@@ -3959,9 +4415,393 @@
             <p:ph type="title"/>
           </p:nvPr>
         </p:nvSpPr>
+        <p:spPr>
+          <a:xfrm>
+            <a:off x="457200" y="152400"/>
+            <a:ext cx="8229600" cy="1143000"/>
+          </a:xfrm>
+        </p:spPr>
+        <p:txBody>
+          <a:bodyPr/>
+          <a:lstStyle/>
+          <a:p>
+            <a:r>
+              <a:rPr lang="en-US" dirty="0">
+                <a:latin typeface="Times New Roman" panose="02020603050405020304" pitchFamily="18" charset="0"/>
+                <a:cs typeface="Times New Roman" panose="02020603050405020304" pitchFamily="18" charset="0"/>
+              </a:rPr>
+              <a:t>Modules</a:t>
+            </a:r>
+          </a:p>
+        </p:txBody>
+      </p:sp>
+      <p:sp>
+        <p:nvSpPr>
+          <p:cNvPr id="3" name="Content Placeholder 2">
+            <a:extLst>
+              <a:ext uri="{FF2B5EF4-FFF2-40B4-BE49-F238E27FC236}">
+                <a16:creationId xmlns:a16="http://schemas.microsoft.com/office/drawing/2014/main" id="{3B96CEFF-22E1-468F-BBEB-CE0ECC84BB4D}"/>
+              </a:ext>
+            </a:extLst>
+          </p:cNvPr>
+          <p:cNvSpPr>
+            <a:spLocks noGrp="1"/>
+          </p:cNvSpPr>
+          <p:nvPr>
+            <p:ph idx="1"/>
+          </p:nvPr>
+        </p:nvSpPr>
+        <p:spPr>
+          <a:xfrm>
+            <a:off x="457199" y="1676400"/>
+            <a:ext cx="8229600" cy="3200400"/>
+          </a:xfrm>
+        </p:spPr>
+        <p:txBody>
+          <a:bodyPr>
+            <a:normAutofit/>
+          </a:bodyPr>
+          <a:lstStyle/>
+          <a:p>
+            <a:pPr algn="just"/>
+            <a:r>
+              <a:rPr lang="en-US" sz="2000" b="1" dirty="0"/>
+              <a:t>Explainable AI (XAI) Module (Planned after ML+GPT pipeline completion)</a:t>
+            </a:r>
+          </a:p>
+          <a:p>
+            <a:pPr lvl="1" algn="just"/>
+            <a:r>
+              <a:rPr lang="en-US" sz="1800" dirty="0"/>
+              <a:t>Provides clear, human-understandable explanations for ML predictions.</a:t>
+            </a:r>
+          </a:p>
+          <a:p>
+            <a:pPr marL="457200" lvl="1" indent="0" algn="just">
+              <a:buNone/>
+            </a:pPr>
+            <a:r>
+              <a:rPr lang="en-US" sz="1900" b="1" dirty="0"/>
+              <a:t>Planned Functionalities:</a:t>
+            </a:r>
+          </a:p>
+          <a:p>
+            <a:pPr lvl="1" algn="just">
+              <a:buFont typeface="Wingdings" panose="05000000000000000000" pitchFamily="2" charset="2"/>
+              <a:buChar char="ü"/>
+            </a:pPr>
+            <a:r>
+              <a:rPr lang="en-US" sz="1800" b="1" dirty="0"/>
+              <a:t>Multi-Stage Explainability Pipeline </a:t>
+            </a:r>
+            <a:r>
+              <a:rPr lang="en-US" sz="1800" dirty="0"/>
+              <a:t>– Uses SHAP (primary), linear coefficients, and heuristic fallback to generate explanations</a:t>
+            </a:r>
+          </a:p>
+          <a:p>
+            <a:pPr lvl="1" algn="just">
+              <a:buFont typeface="Wingdings" panose="05000000000000000000" pitchFamily="2" charset="2"/>
+              <a:buChar char="ü"/>
+            </a:pPr>
+            <a:r>
+              <a:rPr lang="en-US" sz="1800" b="1" dirty="0"/>
+              <a:t>Feature Impact Indicators</a:t>
+            </a:r>
+            <a:r>
+              <a:rPr lang="en-US" sz="1800" dirty="0"/>
+              <a:t> (↑ increases risk, ↓ decreases risk, → neutral)</a:t>
+            </a:r>
+          </a:p>
+          <a:p>
+            <a:pPr lvl="1" algn="just">
+              <a:buFont typeface="Wingdings" panose="05000000000000000000" pitchFamily="2" charset="2"/>
+              <a:buChar char="ü"/>
+            </a:pPr>
+            <a:r>
+              <a:rPr lang="en-US" sz="1800" b="1" dirty="0"/>
+              <a:t>UI Integration </a:t>
+            </a:r>
+            <a:r>
+              <a:rPr lang="en-US" sz="1800" dirty="0"/>
+              <a:t>– Expandable “Explain Prediction” section in UI</a:t>
+            </a:r>
+            <a:endParaRPr lang="en-US" sz="1800" b="1" dirty="0"/>
+          </a:p>
+        </p:txBody>
+      </p:sp>
+      <p:pic>
+        <p:nvPicPr>
+          <p:cNvPr id="11" name="Picture 10">
+            <a:extLst>
+              <a:ext uri="{FF2B5EF4-FFF2-40B4-BE49-F238E27FC236}">
+                <a16:creationId xmlns:a16="http://schemas.microsoft.com/office/drawing/2014/main" id="{EFC3AF28-9103-4C23-99BA-88C32DBDB3E1}"/>
+              </a:ext>
+            </a:extLst>
+          </p:cNvPr>
+          <p:cNvPicPr>
+            <a:picLocks noChangeAspect="1"/>
+          </p:cNvPicPr>
+          <p:nvPr/>
+        </p:nvPicPr>
+        <p:blipFill>
+          <a:blip r:embed="rId3"/>
+          <a:stretch>
+            <a:fillRect/>
+          </a:stretch>
+        </p:blipFill>
+        <p:spPr>
+          <a:xfrm>
+            <a:off x="2728654" y="4632121"/>
+            <a:ext cx="3686689" cy="552527"/>
+          </a:xfrm>
+          <a:prstGeom prst="rect">
+            <a:avLst/>
+          </a:prstGeom>
+        </p:spPr>
+      </p:pic>
+    </p:spTree>
+    <p:extLst>
+      <p:ext uri="{BB962C8B-B14F-4D97-AF65-F5344CB8AC3E}">
+        <p14:creationId xmlns:p14="http://schemas.microsoft.com/office/powerpoint/2010/main" val="2615226752"/>
+      </p:ext>
+    </p:extLst>
+  </p:cSld>
+  <p:clrMapOvr>
+    <a:masterClrMapping/>
+  </p:clrMapOvr>
+</p:sld>
+</file>
+
+<file path=ppt/slides/slide11.xml><?xml version="1.0" encoding="utf-8"?>
+<p:sld xmlns:a="http://schemas.openxmlformats.org/drawingml/2006/main" xmlns:r="http://schemas.openxmlformats.org/officeDocument/2006/relationships" xmlns:p="http://schemas.openxmlformats.org/presentationml/2006/main">
+  <p:cSld>
+    <p:spTree>
+      <p:nvGrpSpPr>
+        <p:cNvPr id="1" name=""/>
+        <p:cNvGrpSpPr/>
+        <p:nvPr/>
+      </p:nvGrpSpPr>
+      <p:grpSpPr>
+        <a:xfrm>
+          <a:off x="0" y="0"/>
+          <a:ext cx="0" cy="0"/>
+          <a:chOff x="0" y="0"/>
+          <a:chExt cx="0" cy="0"/>
+        </a:xfrm>
+      </p:grpSpPr>
+      <p:sp>
+        <p:nvSpPr>
+          <p:cNvPr id="2" name="Title 1">
+            <a:extLst>
+              <a:ext uri="{FF2B5EF4-FFF2-40B4-BE49-F238E27FC236}">
+                <a16:creationId xmlns:a16="http://schemas.microsoft.com/office/drawing/2014/main" id="{156E9FC9-D9B2-4864-978E-1EB201ED2486}"/>
+              </a:ext>
+            </a:extLst>
+          </p:cNvPr>
+          <p:cNvSpPr>
+            <a:spLocks noGrp="1"/>
+          </p:cNvSpPr>
+          <p:nvPr>
+            <p:ph type="title"/>
+          </p:nvPr>
+        </p:nvSpPr>
         <p:spPr/>
         <p:txBody>
           <a:bodyPr/>
+          <a:lstStyle/>
+          <a:p>
+            <a:r>
+              <a:rPr lang="en-US" dirty="0">
+                <a:latin typeface="Times New Roman" panose="02020603050405020304" pitchFamily="18" charset="0"/>
+                <a:cs typeface="Times New Roman" panose="02020603050405020304" pitchFamily="18" charset="0"/>
+              </a:rPr>
+              <a:t>Modules</a:t>
+            </a:r>
+          </a:p>
+        </p:txBody>
+      </p:sp>
+      <p:sp>
+        <p:nvSpPr>
+          <p:cNvPr id="3" name="Content Placeholder 2">
+            <a:extLst>
+              <a:ext uri="{FF2B5EF4-FFF2-40B4-BE49-F238E27FC236}">
+                <a16:creationId xmlns:a16="http://schemas.microsoft.com/office/drawing/2014/main" id="{C1E8BB42-BEC2-4570-B846-96945FE40B0C}"/>
+              </a:ext>
+            </a:extLst>
+          </p:cNvPr>
+          <p:cNvSpPr>
+            <a:spLocks noGrp="1"/>
+          </p:cNvSpPr>
+          <p:nvPr>
+            <p:ph idx="1"/>
+          </p:nvPr>
+        </p:nvSpPr>
+        <p:spPr>
+          <a:xfrm>
+            <a:off x="457200" y="1600200"/>
+            <a:ext cx="8229600" cy="4525963"/>
+          </a:xfrm>
+        </p:spPr>
+        <p:txBody>
+          <a:bodyPr>
+            <a:normAutofit/>
+          </a:bodyPr>
+          <a:lstStyle/>
+          <a:p>
+            <a:r>
+              <a:rPr lang="en-US" sz="2000" b="1" dirty="0"/>
+              <a:t>Data Handling &amp; Persistent Storage Module (Planned)</a:t>
+            </a:r>
+          </a:p>
+          <a:p>
+            <a:pPr lvl="1"/>
+            <a:r>
+              <a:rPr lang="en-US" sz="1800" dirty="0"/>
+              <a:t>Enable long-term storage and retrieval of user prediction history</a:t>
+            </a:r>
+          </a:p>
+          <a:p>
+            <a:pPr marL="457200" lvl="1" indent="0">
+              <a:buNone/>
+            </a:pPr>
+            <a:r>
+              <a:rPr lang="en-US" sz="1900" b="1" dirty="0"/>
+              <a:t>Planned Functionalities:</a:t>
+            </a:r>
+          </a:p>
+          <a:p>
+            <a:pPr lvl="1">
+              <a:buFont typeface="Wingdings" panose="05000000000000000000" pitchFamily="2" charset="2"/>
+              <a:buChar char="ü"/>
+            </a:pPr>
+            <a:r>
+              <a:rPr lang="en-US" sz="1800" b="1" dirty="0"/>
+              <a:t>SQLite Database </a:t>
+            </a:r>
+            <a:r>
+              <a:rPr lang="en-US" sz="1800" dirty="0"/>
+              <a:t>–Replace in-memory storage with persistent DB</a:t>
+            </a:r>
+          </a:p>
+          <a:p>
+            <a:pPr lvl="1">
+              <a:buFont typeface="Wingdings" panose="05000000000000000000" pitchFamily="2" charset="2"/>
+              <a:buChar char="ü"/>
+            </a:pPr>
+            <a:r>
+              <a:rPr lang="en-US" sz="1800" b="1" dirty="0"/>
+              <a:t>User History Retrieval</a:t>
+            </a:r>
+            <a:r>
+              <a:rPr lang="en-US" sz="1800" dirty="0"/>
+              <a:t> – Logged-in users can view past predictions</a:t>
+            </a:r>
+          </a:p>
+          <a:p>
+            <a:pPr lvl="1">
+              <a:buFont typeface="Wingdings" panose="05000000000000000000" pitchFamily="2" charset="2"/>
+              <a:buChar char="ü"/>
+            </a:pPr>
+            <a:r>
+              <a:rPr lang="en-US" sz="1800" b="1" dirty="0"/>
+              <a:t>Guest-to-User Migration</a:t>
+            </a:r>
+            <a:r>
+              <a:rPr lang="en-US" sz="1800" dirty="0"/>
+              <a:t> – Local history merges into DB after login</a:t>
+            </a:r>
+          </a:p>
+          <a:p>
+            <a:pPr lvl="1">
+              <a:buFont typeface="Wingdings" panose="05000000000000000000" pitchFamily="2" charset="2"/>
+              <a:buChar char="ü"/>
+            </a:pPr>
+            <a:r>
+              <a:rPr lang="en-US" sz="1800" b="1" dirty="0"/>
+              <a:t>Delete History </a:t>
+            </a:r>
+            <a:r>
+              <a:rPr lang="en-US" sz="1800" dirty="0"/>
+              <a:t>–Remove specific prediction entries</a:t>
+            </a:r>
+          </a:p>
+          <a:p>
+            <a:pPr marL="457200" lvl="1" indent="0">
+              <a:buNone/>
+            </a:pPr>
+            <a:r>
+              <a:rPr lang="en-US" sz="1800" b="1" dirty="0"/>
+              <a:t>Current Status</a:t>
+            </a:r>
+            <a:r>
+              <a:rPr lang="en-US" sz="1800" dirty="0"/>
+              <a:t>	:</a:t>
+            </a:r>
+          </a:p>
+          <a:p>
+            <a:pPr marL="457200" lvl="1" indent="0">
+              <a:buNone/>
+            </a:pPr>
+            <a:r>
+              <a:rPr lang="en-US" sz="1800" dirty="0"/>
+              <a:t>In-memory storage only; DB implementation planned for next development phase.</a:t>
+            </a:r>
+            <a:endParaRPr lang="en-US" sz="1400" b="1" dirty="0"/>
+          </a:p>
+        </p:txBody>
+      </p:sp>
+    </p:spTree>
+    <p:extLst>
+      <p:ext uri="{BB962C8B-B14F-4D97-AF65-F5344CB8AC3E}">
+        <p14:creationId xmlns:p14="http://schemas.microsoft.com/office/powerpoint/2010/main" val="2061441572"/>
+      </p:ext>
+    </p:extLst>
+  </p:cSld>
+  <p:clrMapOvr>
+    <a:masterClrMapping/>
+  </p:clrMapOvr>
+</p:sld>
+</file>
+
+<file path=ppt/slides/slide12.xml><?xml version="1.0" encoding="utf-8"?>
+<p:sld xmlns:a="http://schemas.openxmlformats.org/drawingml/2006/main" xmlns:r="http://schemas.openxmlformats.org/officeDocument/2006/relationships" xmlns:p="http://schemas.openxmlformats.org/presentationml/2006/main">
+  <p:cSld>
+    <p:spTree>
+      <p:nvGrpSpPr>
+        <p:cNvPr id="1" name=""/>
+        <p:cNvGrpSpPr/>
+        <p:nvPr/>
+      </p:nvGrpSpPr>
+      <p:grpSpPr>
+        <a:xfrm>
+          <a:off x="0" y="0"/>
+          <a:ext cx="0" cy="0"/>
+          <a:chOff x="0" y="0"/>
+          <a:chExt cx="0" cy="0"/>
+        </a:xfrm>
+      </p:grpSpPr>
+      <p:sp>
+        <p:nvSpPr>
+          <p:cNvPr id="2" name="Title 1">
+            <a:extLst>
+              <a:ext uri="{FF2B5EF4-FFF2-40B4-BE49-F238E27FC236}">
+                <a16:creationId xmlns:a16="http://schemas.microsoft.com/office/drawing/2014/main" id="{791FBF50-3D8A-43EE-9464-1B53C6B2470F}"/>
+              </a:ext>
+            </a:extLst>
+          </p:cNvPr>
+          <p:cNvSpPr>
+            <a:spLocks noGrp="1"/>
+          </p:cNvSpPr>
+          <p:nvPr>
+            <p:ph type="title"/>
+          </p:nvPr>
+        </p:nvSpPr>
+        <p:spPr/>
+        <p:txBody>
+          <a:bodyPr>
+            <a:normAutofit/>
+          </a:bodyPr>
           <a:lstStyle/>
           <a:p>
             <a:r>
@@ -4007,6 +4847,474 @@
           <p:cNvPr id="3" name="Content Placeholder 2">
             <a:extLst>
               <a:ext uri="{FF2B5EF4-FFF2-40B4-BE49-F238E27FC236}">
+                <a16:creationId xmlns:a16="http://schemas.microsoft.com/office/drawing/2014/main" id="{6D91B9A2-128E-4E7D-84F3-B11D95555CD7}"/>
+              </a:ext>
+            </a:extLst>
+          </p:cNvPr>
+          <p:cNvSpPr>
+            <a:spLocks noGrp="1"/>
+          </p:cNvSpPr>
+          <p:nvPr>
+            <p:ph idx="1"/>
+          </p:nvPr>
+        </p:nvSpPr>
+        <p:spPr>
+          <a:xfrm>
+            <a:off x="457200" y="1600200"/>
+            <a:ext cx="8001000" cy="4525963"/>
+          </a:xfrm>
+        </p:spPr>
+        <p:txBody>
+          <a:bodyPr>
+            <a:normAutofit/>
+          </a:bodyPr>
+          <a:lstStyle/>
+          <a:p>
+            <a:pPr algn="just"/>
+            <a:r>
+              <a:rPr lang="en-US" sz="1800" b="1" dirty="0"/>
+              <a:t>Machine Learning Layer</a:t>
+            </a:r>
+          </a:p>
+          <a:p>
+            <a:pPr lvl="1" algn="just"/>
+            <a:r>
+              <a:rPr lang="en-US" sz="1700" dirty="0"/>
+              <a:t>Dataset cleaned, balanced using SMOTE</a:t>
+            </a:r>
+          </a:p>
+          <a:p>
+            <a:pPr lvl="1" algn="just"/>
+            <a:r>
+              <a:rPr lang="en-US" sz="1700" dirty="0"/>
+              <a:t>Multiple models trained (RF, XGB, LGBM, CatBoost, Logistic Regression)</a:t>
+            </a:r>
+          </a:p>
+          <a:p>
+            <a:pPr lvl="1" algn="just"/>
+            <a:r>
+              <a:rPr lang="en-US" sz="1700" dirty="0"/>
+              <a:t>Performance evaluated using Accuracy &amp; ROC-AUC</a:t>
+            </a:r>
+          </a:p>
+          <a:p>
+            <a:pPr lvl="1" algn="just"/>
+            <a:r>
+              <a:rPr lang="en-US" sz="1700" dirty="0"/>
+              <a:t>CatBoost Classifier selected as best model (Accuracy: 0.8746)</a:t>
+            </a:r>
+          </a:p>
+          <a:p>
+            <a:pPr lvl="1" algn="just"/>
+            <a:r>
+              <a:rPr lang="en-US" sz="1700" dirty="0"/>
+              <a:t>Final model saved as model.pkl for inference</a:t>
+            </a:r>
+          </a:p>
+          <a:p>
+            <a:pPr marL="457200" lvl="1" indent="0" algn="just">
+              <a:buNone/>
+            </a:pPr>
+            <a:endParaRPr lang="en-US" sz="1400" dirty="0"/>
+          </a:p>
+          <a:p>
+            <a:pPr marL="457200" lvl="1" indent="0" algn="just">
+              <a:buNone/>
+            </a:pPr>
+            <a:endParaRPr lang="en-US" sz="1400" dirty="0"/>
+          </a:p>
+          <a:p>
+            <a:pPr marL="457200" lvl="1" indent="0" algn="just">
+              <a:buNone/>
+            </a:pPr>
+            <a:endParaRPr lang="en-US" sz="1400" dirty="0"/>
+          </a:p>
+          <a:p>
+            <a:pPr algn="just"/>
+            <a:r>
+              <a:rPr lang="en-US" sz="1800" b="1" dirty="0"/>
+              <a:t>AI Guidance Layer</a:t>
+            </a:r>
+          </a:p>
+          <a:p>
+            <a:pPr lvl="1" algn="just"/>
+            <a:r>
+              <a:rPr lang="en-US" sz="1700" dirty="0"/>
+              <a:t>Integrated HuggingFace GPT for generating personalized survival plans</a:t>
+            </a:r>
+          </a:p>
+          <a:p>
+            <a:pPr lvl="1" algn="just"/>
+            <a:r>
+              <a:rPr lang="en-US" sz="1700" dirty="0"/>
+              <a:t>Structured prompt engineering using infant health features</a:t>
+            </a:r>
+          </a:p>
+          <a:p>
+            <a:pPr lvl="1" algn="just"/>
+            <a:r>
+              <a:rPr lang="en-US" sz="1700" dirty="0"/>
+              <a:t>Output parsed into Year-wise actionable steps (0-5 years)</a:t>
+            </a:r>
+          </a:p>
+          <a:p>
+            <a:pPr lvl="1" algn="just"/>
+            <a:r>
+              <a:rPr lang="en-US" sz="1700" dirty="0"/>
+              <a:t>Fallback system provided for API Failure or issues</a:t>
+            </a:r>
+          </a:p>
+        </p:txBody>
+      </p:sp>
+      <p:pic>
+        <p:nvPicPr>
+          <p:cNvPr id="5" name="Picture 4">
+            <a:extLst>
+              <a:ext uri="{FF2B5EF4-FFF2-40B4-BE49-F238E27FC236}">
+                <a16:creationId xmlns:a16="http://schemas.microsoft.com/office/drawing/2014/main" id="{9060A392-8FAB-4C49-9B70-FABC433BC20A}"/>
+              </a:ext>
+            </a:extLst>
+          </p:cNvPr>
+          <p:cNvPicPr>
+            <a:picLocks noChangeAspect="1"/>
+          </p:cNvPicPr>
+          <p:nvPr/>
+        </p:nvPicPr>
+        <p:blipFill rotWithShape="1">
+          <a:blip r:embed="rId2">
+            <a:extLst>
+              <a:ext uri="{28A0092B-C50C-407E-A947-70E740481C1C}">
+                <a14:useLocalDpi xmlns:a14="http://schemas.microsoft.com/office/drawing/2010/main" val="0"/>
+              </a:ext>
+            </a:extLst>
+          </a:blip>
+          <a:srcRect t="19605"/>
+          <a:stretch/>
+        </p:blipFill>
+        <p:spPr>
+          <a:xfrm>
+            <a:off x="599520" y="3591298"/>
+            <a:ext cx="7944959" cy="543765"/>
+          </a:xfrm>
+          <a:prstGeom prst="rect">
+            <a:avLst/>
+          </a:prstGeom>
+        </p:spPr>
+      </p:pic>
+    </p:spTree>
+    <p:extLst>
+      <p:ext uri="{BB962C8B-B14F-4D97-AF65-F5344CB8AC3E}">
+        <p14:creationId xmlns:p14="http://schemas.microsoft.com/office/powerpoint/2010/main" val="4189385619"/>
+      </p:ext>
+    </p:extLst>
+  </p:cSld>
+  <p:clrMapOvr>
+    <a:masterClrMapping/>
+  </p:clrMapOvr>
+</p:sld>
+</file>
+
+<file path=ppt/slides/slide13.xml><?xml version="1.0" encoding="utf-8"?>
+<p:sld xmlns:a="http://schemas.openxmlformats.org/drawingml/2006/main" xmlns:r="http://schemas.openxmlformats.org/officeDocument/2006/relationships" xmlns:p="http://schemas.openxmlformats.org/presentationml/2006/main">
+  <p:cSld>
+    <p:spTree>
+      <p:nvGrpSpPr>
+        <p:cNvPr id="1" name=""/>
+        <p:cNvGrpSpPr/>
+        <p:nvPr/>
+      </p:nvGrpSpPr>
+      <p:grpSpPr>
+        <a:xfrm>
+          <a:off x="0" y="0"/>
+          <a:ext cx="0" cy="0"/>
+          <a:chOff x="0" y="0"/>
+          <a:chExt cx="0" cy="0"/>
+        </a:xfrm>
+      </p:grpSpPr>
+      <p:sp>
+        <p:nvSpPr>
+          <p:cNvPr id="4" name="Title 3">
+            <a:extLst>
+              <a:ext uri="{FF2B5EF4-FFF2-40B4-BE49-F238E27FC236}">
+                <a16:creationId xmlns:a16="http://schemas.microsoft.com/office/drawing/2014/main" id="{8E8DC362-A41F-47DE-A381-45FF95D3DFD7}"/>
+              </a:ext>
+            </a:extLst>
+          </p:cNvPr>
+          <p:cNvSpPr>
+            <a:spLocks noGrp="1"/>
+          </p:cNvSpPr>
+          <p:nvPr>
+            <p:ph type="title"/>
+          </p:nvPr>
+        </p:nvSpPr>
+        <p:spPr/>
+        <p:txBody>
+          <a:bodyPr/>
+          <a:lstStyle/>
+          <a:p>
+            <a:r>
+              <a:rPr kumimoji="0" lang="en-US" sz="4400" b="0" i="0" u="none" strike="noStrike" kern="1200" cap="none" spc="0" normalizeH="0" baseline="0" noProof="0" dirty="0">
+                <a:ln>
+                  <a:noFill/>
+                </a:ln>
+                <a:solidFill>
+                  <a:schemeClr val="tx1"/>
+                </a:solidFill>
+                <a:effectLst/>
+                <a:uLnTx/>
+                <a:uFillTx/>
+                <a:latin typeface="Times New Roman" pitchFamily="18" charset="0"/>
+                <a:ea typeface="+mj-ea"/>
+                <a:cs typeface="Times New Roman" pitchFamily="18" charset="0"/>
+              </a:rPr>
+              <a:t>Technological</a:t>
+            </a:r>
+            <a:r>
+              <a:rPr kumimoji="0" lang="en-US" sz="4400" b="0" i="0" u="none" strike="noStrike" kern="1200" cap="none" spc="0" normalizeH="0" noProof="0" dirty="0">
+                <a:ln>
+                  <a:noFill/>
+                </a:ln>
+                <a:solidFill>
+                  <a:schemeClr val="tx1"/>
+                </a:solidFill>
+                <a:effectLst/>
+                <a:uLnTx/>
+                <a:uFillTx/>
+                <a:latin typeface="Times New Roman" pitchFamily="18" charset="0"/>
+                <a:ea typeface="+mj-ea"/>
+                <a:cs typeface="Times New Roman" pitchFamily="18" charset="0"/>
+              </a:rPr>
+              <a:t> Approach</a:t>
+            </a:r>
+            <a:endParaRPr lang="en-US" dirty="0"/>
+          </a:p>
+        </p:txBody>
+      </p:sp>
+      <p:sp>
+        <p:nvSpPr>
+          <p:cNvPr id="5" name="Content Placeholder 4">
+            <a:extLst>
+              <a:ext uri="{FF2B5EF4-FFF2-40B4-BE49-F238E27FC236}">
+                <a16:creationId xmlns:a16="http://schemas.microsoft.com/office/drawing/2014/main" id="{446F69DC-51AD-4CC0-9C17-69BDE2743474}"/>
+              </a:ext>
+            </a:extLst>
+          </p:cNvPr>
+          <p:cNvSpPr>
+            <a:spLocks noGrp="1"/>
+          </p:cNvSpPr>
+          <p:nvPr>
+            <p:ph idx="1"/>
+          </p:nvPr>
+        </p:nvSpPr>
+        <p:spPr/>
+        <p:txBody>
+          <a:bodyPr>
+            <a:normAutofit/>
+          </a:bodyPr>
+          <a:lstStyle/>
+          <a:p>
+            <a:pPr algn="just"/>
+            <a:r>
+              <a:rPr lang="en-US" sz="1800" b="1" dirty="0"/>
+              <a:t>Backend Layer</a:t>
+            </a:r>
+          </a:p>
+          <a:p>
+            <a:pPr lvl="1" algn="just"/>
+            <a:r>
+              <a:rPr lang="en-US" sz="1700" dirty="0"/>
+              <a:t>Implemented using Flask</a:t>
+            </a:r>
+          </a:p>
+          <a:p>
+            <a:pPr lvl="1" algn="just"/>
+            <a:r>
+              <a:rPr lang="en-US" sz="1700" dirty="0"/>
+              <a:t>Core endpoints:</a:t>
+            </a:r>
+          </a:p>
+          <a:p>
+            <a:pPr lvl="2" algn="just"/>
+            <a:r>
+              <a:rPr lang="en-US" sz="1700" dirty="0"/>
+              <a:t>/</a:t>
+            </a:r>
+            <a:r>
+              <a:rPr lang="en-US" sz="1700" dirty="0" err="1"/>
+              <a:t>api</a:t>
+            </a:r>
+            <a:r>
+              <a:rPr lang="en-US" sz="1700" dirty="0"/>
+              <a:t>/predict → </a:t>
+            </a:r>
+            <a:r>
+              <a:rPr lang="en-US" sz="1700" b="1" dirty="0"/>
+              <a:t>ML + GPT </a:t>
+            </a:r>
+            <a:r>
+              <a:rPr lang="en-US" sz="1700" dirty="0"/>
+              <a:t>prediction pipeline</a:t>
+            </a:r>
+          </a:p>
+          <a:p>
+            <a:pPr lvl="2" algn="just"/>
+            <a:r>
+              <a:rPr lang="en-US" sz="1700" dirty="0"/>
+              <a:t>/predict → frontend-friendly alias</a:t>
+            </a:r>
+          </a:p>
+          <a:p>
+            <a:pPr lvl="1" algn="just"/>
+            <a:r>
+              <a:rPr lang="en-US" sz="1700" dirty="0"/>
+              <a:t>Loads model.pkl, performs inference, triggers GPT, returns final structured JSON</a:t>
+            </a:r>
+          </a:p>
+          <a:p>
+            <a:pPr marL="0" indent="0" algn="just">
+              <a:buNone/>
+            </a:pPr>
+            <a:endParaRPr lang="en-US" sz="1800" b="1" dirty="0"/>
+          </a:p>
+          <a:p>
+            <a:pPr algn="just"/>
+            <a:r>
+              <a:rPr lang="en-US" sz="1800" b="1" dirty="0"/>
+              <a:t>Frontend Layer</a:t>
+            </a:r>
+          </a:p>
+          <a:p>
+            <a:pPr lvl="1" algn="just"/>
+            <a:r>
+              <a:rPr lang="en-US" sz="1700" dirty="0"/>
+              <a:t>Basic UI built using HTML, CSS, JavaScript</a:t>
+            </a:r>
+          </a:p>
+          <a:p>
+            <a:pPr lvl="1" algn="just"/>
+            <a:r>
+              <a:rPr lang="en-US" sz="1700" b="1" dirty="0"/>
+              <a:t>Inputs:</a:t>
+            </a:r>
+            <a:r>
+              <a:rPr lang="en-US" sz="1700" dirty="0"/>
+              <a:t> birth weight, maternal age, immunization, nutrition, socioeconomic, prenatal visits</a:t>
+            </a:r>
+          </a:p>
+          <a:p>
+            <a:pPr lvl="1" algn="just"/>
+            <a:r>
+              <a:rPr lang="en-US" sz="1700" b="1" dirty="0"/>
+              <a:t>Outputs:</a:t>
+            </a:r>
+            <a:r>
+              <a:rPr lang="en-US" sz="1700" dirty="0"/>
+              <a:t> risk probability, risk category, survival plan</a:t>
+            </a:r>
+          </a:p>
+          <a:p>
+            <a:pPr lvl="1" algn="just"/>
+            <a:r>
+              <a:rPr lang="en-US" sz="1700" dirty="0"/>
+              <a:t>Integrated animations, theme toggle, and results visualization</a:t>
+            </a:r>
+          </a:p>
+        </p:txBody>
+      </p:sp>
+    </p:spTree>
+    <p:extLst>
+      <p:ext uri="{BB962C8B-B14F-4D97-AF65-F5344CB8AC3E}">
+        <p14:creationId xmlns:p14="http://schemas.microsoft.com/office/powerpoint/2010/main" val="2112314874"/>
+      </p:ext>
+    </p:extLst>
+  </p:cSld>
+  <p:clrMapOvr>
+    <a:masterClrMapping/>
+  </p:clrMapOvr>
+</p:sld>
+</file>
+
+<file path=ppt/slides/slide14.xml><?xml version="1.0" encoding="utf-8"?>
+<p:sld xmlns:a="http://schemas.openxmlformats.org/drawingml/2006/main" xmlns:r="http://schemas.openxmlformats.org/officeDocument/2006/relationships" xmlns:p="http://schemas.openxmlformats.org/presentationml/2006/main">
+  <p:cSld>
+    <p:spTree>
+      <p:nvGrpSpPr>
+        <p:cNvPr id="1" name=""/>
+        <p:cNvGrpSpPr/>
+        <p:nvPr/>
+      </p:nvGrpSpPr>
+      <p:grpSpPr>
+        <a:xfrm>
+          <a:off x="0" y="0"/>
+          <a:ext cx="0" cy="0"/>
+          <a:chOff x="0" y="0"/>
+          <a:chExt cx="0" cy="0"/>
+        </a:xfrm>
+      </p:grpSpPr>
+      <p:sp>
+        <p:nvSpPr>
+          <p:cNvPr id="2" name="Title 1">
+            <a:extLst>
+              <a:ext uri="{FF2B5EF4-FFF2-40B4-BE49-F238E27FC236}">
+                <a16:creationId xmlns:a16="http://schemas.microsoft.com/office/drawing/2014/main" id="{D38B7F55-5740-40C5-ADF4-D0F19EC6ED0C}"/>
+              </a:ext>
+            </a:extLst>
+          </p:cNvPr>
+          <p:cNvSpPr>
+            <a:spLocks noGrp="1"/>
+          </p:cNvSpPr>
+          <p:nvPr>
+            <p:ph type="title"/>
+          </p:nvPr>
+        </p:nvSpPr>
+        <p:spPr/>
+        <p:txBody>
+          <a:bodyPr/>
+          <a:lstStyle/>
+          <a:p>
+            <a:r>
+              <a:rPr kumimoji="0" lang="en-US" sz="4400" b="0" i="0" u="none" strike="noStrike" kern="1200" cap="none" spc="0" normalizeH="0" baseline="0" noProof="0" dirty="0">
+                <a:ln>
+                  <a:noFill/>
+                </a:ln>
+                <a:solidFill>
+                  <a:schemeClr val="tx1"/>
+                </a:solidFill>
+                <a:effectLst/>
+                <a:uLnTx/>
+                <a:uFillTx/>
+                <a:latin typeface="Times New Roman" pitchFamily="18" charset="0"/>
+                <a:ea typeface="+mj-ea"/>
+                <a:cs typeface="Times New Roman" pitchFamily="18" charset="0"/>
+              </a:rPr>
+              <a:t>Technological</a:t>
+            </a:r>
+            <a:r>
+              <a:rPr kumimoji="0" lang="en-US" sz="4400" b="0" i="0" u="none" strike="noStrike" kern="1200" cap="none" spc="0" normalizeH="0" noProof="0" dirty="0">
+                <a:ln>
+                  <a:noFill/>
+                </a:ln>
+                <a:solidFill>
+                  <a:schemeClr val="tx1"/>
+                </a:solidFill>
+                <a:effectLst/>
+                <a:uLnTx/>
+                <a:uFillTx/>
+                <a:latin typeface="Times New Roman" pitchFamily="18" charset="0"/>
+                <a:ea typeface="+mj-ea"/>
+                <a:cs typeface="Times New Roman" pitchFamily="18" charset="0"/>
+              </a:rPr>
+              <a:t> Approach</a:t>
+            </a:r>
+            <a:endParaRPr lang="en-US" dirty="0"/>
+          </a:p>
+        </p:txBody>
+      </p:sp>
+      <p:sp>
+        <p:nvSpPr>
+          <p:cNvPr id="3" name="Content Placeholder 2">
+            <a:extLst>
+              <a:ext uri="{FF2B5EF4-FFF2-40B4-BE49-F238E27FC236}">
                 <a16:creationId xmlns:a16="http://schemas.microsoft.com/office/drawing/2014/main" id="{ABA25A9A-E52F-41C6-9AD8-D1430D335E8E}"/>
               </a:ext>
             </a:extLst>
@@ -4094,7 +5402,7 @@
 </p:sld>
 </file>
 
-<file path=ppt/slides/slide11.xml><?xml version="1.0" encoding="utf-8"?>
+<file path=ppt/slides/slide15.xml><?xml version="1.0" encoding="utf-8"?>
 <p:sld xmlns:a="http://schemas.openxmlformats.org/drawingml/2006/main" xmlns:r="http://schemas.openxmlformats.org/officeDocument/2006/relationships" xmlns:p="http://schemas.openxmlformats.org/presentationml/2006/main">
   <p:cSld>
     <p:spTree>
@@ -4190,7 +5498,7 @@
 </p:sld>
 </file>
 
-<file path=ppt/slides/slide12.xml><?xml version="1.0" encoding="utf-8"?>
+<file path=ppt/slides/slide16.xml><?xml version="1.0" encoding="utf-8"?>
 <p:sld xmlns:a="http://schemas.openxmlformats.org/drawingml/2006/main" xmlns:r="http://schemas.openxmlformats.org/officeDocument/2006/relationships" xmlns:p="http://schemas.openxmlformats.org/presentationml/2006/main">
   <p:cSld>
     <p:spTree>
@@ -4654,10 +5962,10 @@
       </p:grpSpPr>
       <p:sp>
         <p:nvSpPr>
-          <p:cNvPr id="2" name="Title 1">
+          <p:cNvPr id="3" name="Title 2">
             <a:extLst>
               <a:ext uri="{FF2B5EF4-FFF2-40B4-BE49-F238E27FC236}">
-                <a16:creationId xmlns:a16="http://schemas.microsoft.com/office/drawing/2014/main" id="{AB8B55E5-38B1-4C25-A1B5-DD0629DBE58B}"/>
+                <a16:creationId xmlns:a16="http://schemas.microsoft.com/office/drawing/2014/main" id="{7882372E-4DED-4F6F-AE88-F919B3F08309}"/>
               </a:ext>
             </a:extLst>
           </p:cNvPr>
@@ -4678,17 +5986,17 @@
                 <a:latin typeface="Times New Roman" panose="02020603050405020304" pitchFamily="18" charset="0"/>
                 <a:cs typeface="Times New Roman" panose="02020603050405020304" pitchFamily="18" charset="0"/>
               </a:rPr>
-              <a:t>ABSTRACT (V-1)</a:t>
-            </a:r>
-          </a:p>
-        </p:txBody>
-      </p:sp>
-      <p:sp>
-        <p:nvSpPr>
-          <p:cNvPr id="3" name="Content Placeholder 2">
+              <a:t>ABSTRACT</a:t>
+            </a:r>
+          </a:p>
+        </p:txBody>
+      </p:sp>
+      <p:sp>
+        <p:nvSpPr>
+          <p:cNvPr id="4" name="Content Placeholder 3">
             <a:extLst>
               <a:ext uri="{FF2B5EF4-FFF2-40B4-BE49-F238E27FC236}">
-                <a16:creationId xmlns:a16="http://schemas.microsoft.com/office/drawing/2014/main" id="{29B3099B-A895-49F5-9582-7EFE50A8C1A1}"/>
+                <a16:creationId xmlns:a16="http://schemas.microsoft.com/office/drawing/2014/main" id="{A01483D7-4F7D-494C-BE6E-6B4B8B8AFE41}"/>
               </a:ext>
             </a:extLst>
           </p:cNvPr>
@@ -4699,19 +6007,110 @@
             <p:ph idx="1"/>
           </p:nvPr>
         </p:nvSpPr>
-        <p:spPr/>
+        <p:spPr>
+          <a:xfrm>
+            <a:off x="457200" y="1600200"/>
+            <a:ext cx="8229600" cy="4724400"/>
+          </a:xfrm>
+        </p:spPr>
         <p:txBody>
           <a:bodyPr>
-            <a:normAutofit/>
+            <a:normAutofit fontScale="85000" lnSpcReduction="20000"/>
           </a:bodyPr>
           <a:lstStyle/>
           <a:p>
-            <a:pPr marL="0" indent="0">
+            <a:pPr marL="0" indent="0" algn="just">
               <a:buNone/>
             </a:pPr>
             <a:r>
-              <a:rPr lang="en-US" sz="1800" dirty="0"/>
-              <a:t>Infant mortality continues to be a major concern in pediatric healthcare, particularly among children under the age of five. Early identification of infants at high risk enables timely preventive interventions that can greatly improve survival outcomes.</a:t>
+              <a:rPr lang="en-US" sz="2100" dirty="0"/>
+              <a:t>Infant mortality remains a critical global health challenge, especially among children under the age of five. Early identification of infants who are at higher risk is essential for enabling timely intervention and improving survival outcomes.</a:t>
+            </a:r>
+          </a:p>
+          <a:p>
+            <a:pPr marL="0" indent="0" algn="just">
+              <a:buNone/>
+            </a:pPr>
+            <a:endParaRPr lang="en-US" sz="2100" dirty="0"/>
+          </a:p>
+          <a:p>
+            <a:pPr marL="0" indent="0" algn="just">
+              <a:buNone/>
+            </a:pPr>
+            <a:r>
+              <a:rPr lang="en-US" sz="2100" dirty="0"/>
+              <a:t>This project introduces an integrated </a:t>
+            </a:r>
+            <a:r>
+              <a:rPr lang="en-US" sz="2100" b="1" dirty="0"/>
+              <a:t>Machine Learning + AI–driven framework</a:t>
+            </a:r>
+            <a:r>
+              <a:rPr lang="en-US" sz="2100" dirty="0"/>
+              <a:t> designed to assess infant mortality risk using key maternal and infant health indicators, including:</a:t>
+            </a:r>
+          </a:p>
+          <a:p>
+            <a:pPr lvl="1" algn="just"/>
+            <a:r>
+              <a:rPr lang="en-US" sz="2000" dirty="0"/>
+              <a:t>Birth weight</a:t>
+            </a:r>
+          </a:p>
+          <a:p>
+            <a:pPr lvl="1" algn="just"/>
+            <a:r>
+              <a:rPr lang="en-US" sz="2000" dirty="0"/>
+              <a:t>Maternal age</a:t>
+            </a:r>
+          </a:p>
+          <a:p>
+            <a:pPr lvl="1" algn="just"/>
+            <a:r>
+              <a:rPr lang="en-US" sz="2000" dirty="0"/>
+              <a:t>Immunization status</a:t>
+            </a:r>
+          </a:p>
+          <a:p>
+            <a:pPr lvl="1" algn="just"/>
+            <a:r>
+              <a:rPr lang="en-US" sz="2000" dirty="0"/>
+              <a:t>Nutrition score</a:t>
+            </a:r>
+          </a:p>
+          <a:p>
+            <a:pPr lvl="1" algn="just"/>
+            <a:r>
+              <a:rPr lang="en-US" sz="2000" dirty="0"/>
+              <a:t>Socioeconomic category</a:t>
+            </a:r>
+          </a:p>
+          <a:p>
+            <a:pPr lvl="1" algn="just"/>
+            <a:r>
+              <a:rPr lang="en-US" sz="2000" dirty="0"/>
+              <a:t>Prenatal care visits</a:t>
+            </a:r>
+          </a:p>
+          <a:p>
+            <a:pPr algn="just"/>
+            <a:endParaRPr lang="en-US" sz="2100" dirty="0"/>
+          </a:p>
+          <a:p>
+            <a:pPr marL="0" indent="0" algn="just">
+              <a:buNone/>
+            </a:pPr>
+            <a:r>
+              <a:rPr lang="en-US" sz="2100" dirty="0"/>
+              <a:t>Using these features, the system applies supervised machine learning classification techniques to predict mortality risk. Multiple models were trained and evaluated using a balanced dataset (SMOTE), and </a:t>
+            </a:r>
+            <a:r>
+              <a:rPr lang="en-US" sz="2100" b="1" dirty="0"/>
+              <a:t>CatBoostClassifier</a:t>
+            </a:r>
+            <a:r>
+              <a:rPr lang="en-US" sz="2100" dirty="0"/>
+              <a:t> achieved the highest accuracy and was selected as the final predictive model.</a:t>
             </a:r>
           </a:p>
           <a:p>
@@ -4719,56 +6118,13 @@
               <a:buNone/>
             </a:pPr>
             <a:endParaRPr lang="en-US" sz="1800" dirty="0"/>
-          </a:p>
-          <a:p>
-            <a:pPr marL="0" indent="0">
-              <a:buNone/>
-            </a:pPr>
-            <a:r>
-              <a:rPr lang="en-US" sz="1800" dirty="0"/>
-              <a:t>This project presents a </a:t>
-            </a:r>
-            <a:r>
-              <a:rPr lang="en-US" sz="1800" b="1" dirty="0"/>
-              <a:t>Machine Learning and AI-powered system</a:t>
-            </a:r>
-            <a:r>
-              <a:rPr lang="en-US" sz="1800" dirty="0"/>
-              <a:t> designed to predict infant mortality risk using key maternal and infant health indicators such as birth weight, maternal age, immunization status, nutrition score, socioeconomic category, and prenatal care visits.</a:t>
-            </a:r>
-          </a:p>
-          <a:p>
-            <a:pPr marL="0" indent="0">
-              <a:buNone/>
-            </a:pPr>
-            <a:endParaRPr lang="en-US" sz="1800" dirty="0"/>
-          </a:p>
-          <a:p>
-            <a:pPr marL="0" indent="0">
-              <a:buNone/>
-            </a:pPr>
-            <a:r>
-              <a:rPr lang="en-US" sz="1800" dirty="0"/>
-              <a:t>A supervised ML model was trained on structured datasets, and after evaluating multiple algorithms, </a:t>
-            </a:r>
-            <a:r>
-              <a:rPr lang="en-US" sz="1800" b="1" dirty="0"/>
-              <a:t>CatBoost emerged as the best-performing model</a:t>
-            </a:r>
-            <a:r>
-              <a:rPr lang="en-US" sz="1800" dirty="0"/>
-              <a:t>, providing accurate classification of infants into low-risk and high-risk categories.</a:t>
-            </a:r>
-          </a:p>
-          <a:p>
-            <a:endParaRPr lang="en-US" dirty="0"/>
           </a:p>
         </p:txBody>
       </p:sp>
     </p:spTree>
     <p:extLst>
       <p:ext uri="{BB962C8B-B14F-4D97-AF65-F5344CB8AC3E}">
-        <p14:creationId xmlns:p14="http://schemas.microsoft.com/office/powerpoint/2010/main" val="117291509"/>
+        <p14:creationId xmlns:p14="http://schemas.microsoft.com/office/powerpoint/2010/main" val="1215694234"/>
       </p:ext>
     </p:extLst>
   </p:cSld>
@@ -4821,7 +6177,7 @@
                 <a:latin typeface="Times New Roman" panose="02020603050405020304" pitchFamily="18" charset="0"/>
                 <a:cs typeface="Times New Roman" panose="02020603050405020304" pitchFamily="18" charset="0"/>
               </a:rPr>
-              <a:t>ABSTRACT (V-1)</a:t>
+              <a:t>ABSTRACT</a:t>
             </a:r>
           </a:p>
         </p:txBody>
@@ -4842,87 +6198,136 @@
             <p:ph idx="1"/>
           </p:nvPr>
         </p:nvSpPr>
-        <p:spPr/>
+        <p:spPr>
+          <a:xfrm>
+            <a:off x="457200" y="1600200"/>
+            <a:ext cx="8229600" cy="4724400"/>
+          </a:xfrm>
+        </p:spPr>
         <p:txBody>
           <a:bodyPr>
-            <a:normAutofit/>
+            <a:normAutofit lnSpcReduction="10000"/>
           </a:bodyPr>
           <a:lstStyle/>
           <a:p>
-            <a:pPr marL="0" indent="0">
+            <a:pPr marL="0" indent="0" algn="just">
               <a:buNone/>
             </a:pPr>
             <a:r>
               <a:rPr lang="en-US" sz="1800" dirty="0"/>
-              <a:t>For infants identified as high-risk, the system integrates a </a:t>
+              <a:t>Infants identified as </a:t>
             </a:r>
             <a:r>
               <a:rPr lang="en-US" sz="1800" b="1" dirty="0"/>
-              <a:t>HuggingFace GPT-based AI engine</a:t>
+              <a:t>high-risk</a:t>
             </a:r>
             <a:r>
               <a:rPr lang="en-US" sz="1800" dirty="0"/>
-              <a:t> to generate personalized survival plans. These recommendations include nutritional guidance, preventive care measures, follow-up schedules, developmental activities, and physical well-being guidelines.</a:t>
-            </a:r>
-          </a:p>
-          <a:p>
-            <a:pPr marL="0" indent="0">
+              <a:t> receive a personalized survival plan generated through an integrated </a:t>
+            </a:r>
+            <a:r>
+              <a:rPr lang="en-US" sz="1800" b="1" dirty="0"/>
+              <a:t>GPT-based AI module</a:t>
+            </a:r>
+            <a:r>
+              <a:rPr lang="en-US" sz="1800" dirty="0"/>
+              <a:t>. These plans provide actionable, year-wise recommendations, including:</a:t>
+            </a:r>
+          </a:p>
+          <a:p>
+            <a:pPr lvl="1" algn="just"/>
+            <a:r>
+              <a:rPr lang="en-US" sz="1800" dirty="0"/>
+              <a:t>Nutrition improvements</a:t>
+            </a:r>
+          </a:p>
+          <a:p>
+            <a:pPr lvl="1" algn="just"/>
+            <a:r>
+              <a:rPr lang="en-US" sz="1800" dirty="0"/>
+              <a:t>Preventive healthcare steps</a:t>
+            </a:r>
+          </a:p>
+          <a:p>
+            <a:pPr lvl="1" algn="just"/>
+            <a:r>
+              <a:rPr lang="en-US" sz="1800" dirty="0"/>
+              <a:t>Follow-up and monitoring schedules</a:t>
+            </a:r>
+          </a:p>
+          <a:p>
+            <a:pPr lvl="1" algn="just"/>
+            <a:r>
+              <a:rPr lang="en-US" sz="1800" dirty="0"/>
+              <a:t>Early childhood developmental activities</a:t>
+            </a:r>
+          </a:p>
+          <a:p>
+            <a:pPr marL="0" indent="0" algn="just">
               <a:buNone/>
             </a:pPr>
             <a:endParaRPr lang="en-US" sz="1800" dirty="0"/>
           </a:p>
           <a:p>
-            <a:pPr marL="0" indent="0">
+            <a:pPr marL="0" indent="0" algn="just">
               <a:buNone/>
             </a:pPr>
             <a:r>
               <a:rPr lang="en-US" sz="1800" dirty="0"/>
-              <a:t>A functional </a:t>
+              <a:t>The system is deployed through a </a:t>
             </a:r>
             <a:r>
               <a:rPr lang="en-US" sz="1800" b="1" dirty="0"/>
-              <a:t>Flask-based backend API</a:t>
+              <a:t>web-based interface</a:t>
             </a:r>
             <a:r>
               <a:rPr lang="en-US" sz="1800" dirty="0"/>
-              <a:t> and a </a:t>
-            </a:r>
-            <a:r>
-              <a:rPr lang="en-US" sz="1800" b="1" dirty="0"/>
-              <a:t>basic web interface</a:t>
-            </a:r>
-            <a:r>
-              <a:rPr lang="en-US" sz="1800" dirty="0"/>
-              <a:t> were developed to allow caregivers and healthcare workers to input infant data and instantly receive model predictions along with AI-generated recommendations. Early evaluation has demonstrated strong prediction accuracy from CatBoost and meaningful, structured guidance from the GPT model.</a:t>
-            </a:r>
-          </a:p>
-          <a:p>
-            <a:pPr marL="0" indent="0">
+              <a:t>, enabling caregivers and healthcare workers to enter infant health details and instantly receive the ML-predicted risk along with AI-generated guidance.</a:t>
+            </a:r>
+          </a:p>
+          <a:p>
+            <a:pPr marL="0" indent="0" algn="just">
               <a:buNone/>
             </a:pPr>
             <a:endParaRPr lang="en-US" sz="1800" dirty="0"/>
           </a:p>
           <a:p>
+            <a:pPr marL="0" indent="0" algn="just">
+              <a:buNone/>
+            </a:pPr>
+            <a:r>
+              <a:rPr lang="en-US" sz="1800" dirty="0"/>
+              <a:t>With a trained </a:t>
+            </a:r>
+            <a:r>
+              <a:rPr lang="en-US" sz="1800" b="1" dirty="0"/>
+              <a:t>CatBoostClassifier</a:t>
+            </a:r>
+            <a:r>
+              <a:rPr lang="en-US" sz="1800" dirty="0"/>
+              <a:t> model powering risk prediction and a robust GPT engine generating structured survival plans, the system demonstrates strong potential to enhance pediatric care through </a:t>
+            </a:r>
+            <a:r>
+              <a:rPr lang="en-US" sz="1800" b="1" dirty="0"/>
+              <a:t>data-driven decision support and intelligent recommendation generation</a:t>
+            </a:r>
+            <a:r>
+              <a:rPr lang="en-US" sz="1800" dirty="0"/>
+              <a:t>.</a:t>
+            </a:r>
+          </a:p>
+          <a:p>
             <a:pPr marL="0" indent="0">
               <a:buNone/>
             </a:pPr>
-            <a:r>
-              <a:rPr lang="en-US" sz="1800" dirty="0"/>
-              <a:t>The progress achieved so far highlights the potential of combining ML-driven risk assessment with AI-generated decision support to strengthen proactive pediatric care and reduce preventable infant mortality.</a:t>
-            </a:r>
-          </a:p>
-          <a:p>
-            <a:pPr marL="0" indent="0">
-              <a:buNone/>
-            </a:pPr>
-            <a:endParaRPr lang="en-US" dirty="0"/>
+            <a:endParaRPr lang="en-US" sz="1800" dirty="0"/>
           </a:p>
         </p:txBody>
       </p:sp>
     </p:spTree>
     <p:extLst>
       <p:ext uri="{BB962C8B-B14F-4D97-AF65-F5344CB8AC3E}">
-        <p14:creationId xmlns:p14="http://schemas.microsoft.com/office/powerpoint/2010/main" val="3100582639"/>
+        <p14:creationId xmlns:p14="http://schemas.microsoft.com/office/powerpoint/2010/main" val="352254826"/>
       </p:ext>
     </p:extLst>
   </p:cSld>
@@ -4951,10 +6356,10 @@
       </p:grpSpPr>
       <p:sp>
         <p:nvSpPr>
-          <p:cNvPr id="3" name="Title 2">
+          <p:cNvPr id="2" name="Title 1">
             <a:extLst>
               <a:ext uri="{FF2B5EF4-FFF2-40B4-BE49-F238E27FC236}">
-                <a16:creationId xmlns:a16="http://schemas.microsoft.com/office/drawing/2014/main" id="{7882372E-4DED-4F6F-AE88-F919B3F08309}"/>
+                <a16:creationId xmlns:a16="http://schemas.microsoft.com/office/drawing/2014/main" id="{DB08CBDE-0827-4FD2-A155-317D276AAC9A}"/>
               </a:ext>
             </a:extLst>
           </p:cNvPr>
@@ -4975,17 +6380,17 @@
                 <a:latin typeface="Times New Roman" panose="02020603050405020304" pitchFamily="18" charset="0"/>
                 <a:cs typeface="Times New Roman" panose="02020603050405020304" pitchFamily="18" charset="0"/>
               </a:rPr>
-              <a:t>ABSTRACT (V-2)</a:t>
-            </a:r>
-          </a:p>
-        </p:txBody>
-      </p:sp>
-      <p:sp>
-        <p:nvSpPr>
-          <p:cNvPr id="4" name="Content Placeholder 3">
+              <a:t>Modules</a:t>
+            </a:r>
+          </a:p>
+        </p:txBody>
+      </p:sp>
+      <p:sp>
+        <p:nvSpPr>
+          <p:cNvPr id="3" name="Content Placeholder 2">
             <a:extLst>
               <a:ext uri="{FF2B5EF4-FFF2-40B4-BE49-F238E27FC236}">
-                <a16:creationId xmlns:a16="http://schemas.microsoft.com/office/drawing/2014/main" id="{A01483D7-4F7D-494C-BE6E-6B4B8B8AFE41}"/>
+                <a16:creationId xmlns:a16="http://schemas.microsoft.com/office/drawing/2014/main" id="{4F8DE8CD-9A9D-4D80-AA3B-CA32C36B5B45}"/>
               </a:ext>
             </a:extLst>
           </p:cNvPr>
@@ -4996,124 +6401,69 @@
             <p:ph idx="1"/>
           </p:nvPr>
         </p:nvSpPr>
-        <p:spPr>
-          <a:xfrm>
-            <a:off x="457200" y="1600200"/>
-            <a:ext cx="8229600" cy="4724400"/>
-          </a:xfrm>
-        </p:spPr>
+        <p:spPr/>
         <p:txBody>
           <a:bodyPr>
-            <a:normAutofit fontScale="85000" lnSpcReduction="20000"/>
+            <a:normAutofit lnSpcReduction="10000"/>
           </a:bodyPr>
           <a:lstStyle/>
           <a:p>
-            <a:pPr marL="0" indent="0" algn="just">
-              <a:buNone/>
-            </a:pPr>
-            <a:r>
-              <a:rPr lang="en-US" sz="2100" dirty="0"/>
-              <a:t>Infant mortality remains a critical global health challenge, especially among children under the age of five. Early identification of infants who are at higher risk is essential for enabling timely intervention and improving survival outcomes.</a:t>
-            </a:r>
-          </a:p>
-          <a:p>
-            <a:pPr marL="0" indent="0" algn="just">
-              <a:buNone/>
-            </a:pPr>
-            <a:endParaRPr lang="en-US" sz="2100" dirty="0"/>
-          </a:p>
-          <a:p>
-            <a:pPr marL="0" indent="0" algn="just">
-              <a:buNone/>
-            </a:pPr>
-            <a:r>
-              <a:rPr lang="en-US" sz="2100" dirty="0"/>
-              <a:t>This project introduces an integrated </a:t>
-            </a:r>
-            <a:r>
-              <a:rPr lang="en-US" sz="2100" b="1" dirty="0"/>
-              <a:t>Machine Learning + AI–driven framework</a:t>
-            </a:r>
-            <a:r>
-              <a:rPr lang="en-US" sz="2100" dirty="0"/>
-              <a:t> designed to assess infant mortality risk using key maternal and infant health indicators, including:</a:t>
-            </a:r>
-          </a:p>
-          <a:p>
-            <a:pPr lvl="1" algn="just"/>
-            <a:r>
-              <a:rPr lang="en-US" sz="2000" dirty="0"/>
-              <a:t>Birth weight</a:t>
-            </a:r>
-          </a:p>
-          <a:p>
-            <a:pPr lvl="1" algn="just"/>
-            <a:r>
-              <a:rPr lang="en-US" sz="2000" dirty="0"/>
-              <a:t>Maternal age</a:t>
-            </a:r>
-          </a:p>
-          <a:p>
-            <a:pPr lvl="1" algn="just"/>
-            <a:r>
-              <a:rPr lang="en-US" sz="2000" dirty="0"/>
-              <a:t>Immunization status</a:t>
-            </a:r>
-          </a:p>
-          <a:p>
-            <a:pPr lvl="1" algn="just"/>
-            <a:r>
-              <a:rPr lang="en-US" sz="2000" dirty="0"/>
-              <a:t>Nutrition score</a:t>
-            </a:r>
-          </a:p>
-          <a:p>
-            <a:pPr lvl="1" algn="just"/>
-            <a:r>
-              <a:rPr lang="en-US" sz="2000" dirty="0"/>
-              <a:t>Socioeconomic category</a:t>
-            </a:r>
-          </a:p>
-          <a:p>
-            <a:pPr lvl="1" algn="just"/>
-            <a:r>
-              <a:rPr lang="en-US" sz="2000" dirty="0"/>
-              <a:t>Prenatal care visits</a:t>
-            </a:r>
-          </a:p>
-          <a:p>
-            <a:pPr algn="just"/>
-            <a:endParaRPr lang="en-US" sz="2100" dirty="0"/>
-          </a:p>
-          <a:p>
-            <a:pPr marL="0" indent="0" algn="just">
-              <a:buNone/>
-            </a:pPr>
-            <a:r>
-              <a:rPr lang="en-US" sz="2100" dirty="0"/>
-              <a:t>Using these features, the system applies supervised machine learning classification techniques to predict mortality risk. Multiple models were trained and evaluated using a balanced dataset (SMOTE), and </a:t>
-            </a:r>
-            <a:r>
-              <a:rPr lang="en-US" sz="2100" b="1" dirty="0"/>
-              <a:t>CatBoostClassifier</a:t>
-            </a:r>
-            <a:r>
-              <a:rPr lang="en-US" sz="2100" dirty="0"/>
-              <a:t> achieved the highest accuracy and was selected as the final predictive model.</a:t>
-            </a:r>
-          </a:p>
-          <a:p>
-            <a:pPr marL="0" indent="0">
-              <a:buNone/>
-            </a:pPr>
-            <a:endParaRPr lang="en-US" sz="1800" dirty="0"/>
+            <a:r>
+              <a:rPr lang="en-US" sz="2400" dirty="0"/>
+              <a:t>User Authentication Module</a:t>
+            </a:r>
+          </a:p>
+          <a:p>
+            <a:endParaRPr lang="en-US" sz="2400" dirty="0"/>
+          </a:p>
+          <a:p>
+            <a:r>
+              <a:rPr lang="en-US" sz="2400" dirty="0"/>
+              <a:t>User Interface &amp; Input Collection Module</a:t>
+            </a:r>
+          </a:p>
+          <a:p>
+            <a:endParaRPr lang="en-US" sz="2400" dirty="0"/>
+          </a:p>
+          <a:p>
+            <a:r>
+              <a:rPr lang="en-US" sz="2400" dirty="0"/>
+              <a:t>Machine Learning Prediction Module</a:t>
+            </a:r>
+          </a:p>
+          <a:p>
+            <a:endParaRPr lang="en-US" sz="2400" dirty="0"/>
+          </a:p>
+          <a:p>
+            <a:r>
+              <a:rPr lang="en-US" sz="2400" dirty="0"/>
+              <a:t>AI Survival Plan Generator Module</a:t>
+            </a:r>
+          </a:p>
+          <a:p>
+            <a:endParaRPr lang="en-US" sz="2400" dirty="0"/>
+          </a:p>
+          <a:p>
+            <a:r>
+              <a:rPr lang="en-US" sz="2400" dirty="0"/>
+              <a:t>Explainable AI (XAI) Module</a:t>
+            </a:r>
+          </a:p>
+          <a:p>
+            <a:endParaRPr lang="en-US" sz="2400" dirty="0"/>
+          </a:p>
+          <a:p>
+            <a:r>
+              <a:rPr lang="en-US" sz="2400" dirty="0"/>
+              <a:t>Data Handling &amp; Persistent Storage Module</a:t>
+            </a:r>
           </a:p>
         </p:txBody>
       </p:sp>
     </p:spTree>
     <p:extLst>
       <p:ext uri="{BB962C8B-B14F-4D97-AF65-F5344CB8AC3E}">
-        <p14:creationId xmlns:p14="http://schemas.microsoft.com/office/powerpoint/2010/main" val="1215694234"/>
+        <p14:creationId xmlns:p14="http://schemas.microsoft.com/office/powerpoint/2010/main" val="3499909632"/>
       </p:ext>
     </p:extLst>
   </p:cSld>
@@ -5142,10 +6492,10 @@
       </p:grpSpPr>
       <p:sp>
         <p:nvSpPr>
-          <p:cNvPr id="3" name="Title 2">
+          <p:cNvPr id="5" name="Title 4">
             <a:extLst>
               <a:ext uri="{FF2B5EF4-FFF2-40B4-BE49-F238E27FC236}">
-                <a16:creationId xmlns:a16="http://schemas.microsoft.com/office/drawing/2014/main" id="{7882372E-4DED-4F6F-AE88-F919B3F08309}"/>
+                <a16:creationId xmlns:a16="http://schemas.microsoft.com/office/drawing/2014/main" id="{2E70F242-9986-45FA-B548-3B3C2804DEC9}"/>
               </a:ext>
             </a:extLst>
           </p:cNvPr>
@@ -5166,17 +6516,17 @@
                 <a:latin typeface="Times New Roman" panose="02020603050405020304" pitchFamily="18" charset="0"/>
                 <a:cs typeface="Times New Roman" panose="02020603050405020304" pitchFamily="18" charset="0"/>
               </a:rPr>
-              <a:t>ABSTRACT (V-2)</a:t>
-            </a:r>
-          </a:p>
-        </p:txBody>
-      </p:sp>
-      <p:sp>
-        <p:nvSpPr>
-          <p:cNvPr id="4" name="Content Placeholder 3">
+              <a:t>Modules</a:t>
+            </a:r>
+          </a:p>
+        </p:txBody>
+      </p:sp>
+      <p:sp>
+        <p:nvSpPr>
+          <p:cNvPr id="6" name="Content Placeholder 5">
             <a:extLst>
               <a:ext uri="{FF2B5EF4-FFF2-40B4-BE49-F238E27FC236}">
-                <a16:creationId xmlns:a16="http://schemas.microsoft.com/office/drawing/2014/main" id="{A01483D7-4F7D-494C-BE6E-6B4B8B8AFE41}"/>
+                <a16:creationId xmlns:a16="http://schemas.microsoft.com/office/drawing/2014/main" id="{47F35DF9-5B40-45A4-8316-95C987905211}"/>
               </a:ext>
             </a:extLst>
           </p:cNvPr>
@@ -5189,134 +6539,133 @@
         </p:nvSpPr>
         <p:spPr>
           <a:xfrm>
-            <a:off x="457200" y="1600200"/>
-            <a:ext cx="8229600" cy="4724400"/>
+            <a:off x="457200" y="1219200"/>
+            <a:ext cx="8229600" cy="4906963"/>
           </a:xfrm>
         </p:spPr>
         <p:txBody>
           <a:bodyPr>
-            <a:normAutofit lnSpcReduction="10000"/>
+            <a:normAutofit/>
           </a:bodyPr>
           <a:lstStyle/>
           <a:p>
-            <a:pPr marL="0" indent="0" algn="just">
+            <a:pPr algn="just"/>
+            <a:r>
+              <a:rPr lang="en-US" sz="2000" b="1" dirty="0"/>
+              <a:t>User Authentication Module</a:t>
+            </a:r>
+          </a:p>
+          <a:p>
+            <a:pPr lvl="1" algn="just"/>
+            <a:r>
+              <a:rPr lang="en-US" sz="1800" dirty="0"/>
+              <a:t>Provides secure access and personalized history management for each user.</a:t>
+            </a:r>
+          </a:p>
+          <a:p>
+            <a:pPr marL="457200" lvl="1" indent="0" algn="just">
               <a:buNone/>
             </a:pPr>
             <a:r>
+              <a:rPr lang="en-US" sz="1900" b="1" dirty="0"/>
+              <a:t>Key Functionalities:</a:t>
+            </a:r>
+          </a:p>
+          <a:p>
+            <a:pPr lvl="1" algn="just">
+              <a:buFont typeface="Wingdings" panose="05000000000000000000" pitchFamily="2" charset="2"/>
+              <a:buChar char="ü"/>
+            </a:pPr>
+            <a:r>
+              <a:rPr lang="en-US" sz="1800" b="1" dirty="0"/>
+              <a:t>User Registration </a:t>
+            </a:r>
+            <a:r>
               <a:rPr lang="en-US" sz="1800" dirty="0"/>
-              <a:t>Infants identified as </a:t>
-            </a:r>
+              <a:t>– Creates new accounts with securely hashed passwords</a:t>
+            </a:r>
+          </a:p>
+          <a:p>
+            <a:pPr lvl="1" algn="just">
+              <a:buFont typeface="Wingdings" panose="05000000000000000000" pitchFamily="2" charset="2"/>
+              <a:buChar char="ü"/>
+            </a:pPr>
             <a:r>
               <a:rPr lang="en-US" sz="1800" b="1" dirty="0"/>
-              <a:t>high-risk</a:t>
+              <a:t>User Login </a:t>
             </a:r>
             <a:r>
               <a:rPr lang="en-US" sz="1800" dirty="0"/>
-              <a:t> receive a personalized survival plan generated through an integrated </a:t>
-            </a:r>
+              <a:t>– Session-based authentication using Flask server sessions</a:t>
+            </a:r>
+          </a:p>
+          <a:p>
+            <a:pPr lvl="1" algn="just">
+              <a:buFont typeface="Wingdings" panose="05000000000000000000" pitchFamily="2" charset="2"/>
+              <a:buChar char="ü"/>
+            </a:pPr>
             <a:r>
               <a:rPr lang="en-US" sz="1800" b="1" dirty="0"/>
-              <a:t>GPT-based AI module</a:t>
+              <a:t>Guest-to-User Sync </a:t>
+            </a:r>
+            <a:r>
+              <a:rPr lang="en-US" sz="1600" dirty="0"/>
+              <a:t>– </a:t>
             </a:r>
             <a:r>
               <a:rPr lang="en-US" sz="1800" dirty="0"/>
-              <a:t>. These plans provide actionable, year-wise recommendations, including:</a:t>
-            </a:r>
-          </a:p>
-          <a:p>
-            <a:pPr lvl="1" algn="just"/>
+              <a:t>Merges guest predictions into user’s permanent history after login</a:t>
+            </a:r>
+          </a:p>
+          <a:p>
+            <a:pPr lvl="1" algn="just">
+              <a:buFont typeface="Wingdings" panose="05000000000000000000" pitchFamily="2" charset="2"/>
+              <a:buChar char="ü"/>
+            </a:pPr>
+            <a:r>
+              <a:rPr lang="en-US" sz="1800" b="1" dirty="0"/>
+              <a:t>Secure Session Handling </a:t>
+            </a:r>
             <a:r>
               <a:rPr lang="en-US" sz="1800" dirty="0"/>
-              <a:t>Nutrition improvements</a:t>
-            </a:r>
-          </a:p>
-          <a:p>
-            <a:pPr lvl="1" algn="just"/>
-            <a:r>
-              <a:rPr lang="en-US" sz="1800" dirty="0"/>
-              <a:t>Preventive healthcare steps</a:t>
-            </a:r>
-          </a:p>
-          <a:p>
-            <a:pPr lvl="1" algn="just"/>
-            <a:r>
-              <a:rPr lang="en-US" sz="1800" dirty="0"/>
-              <a:t>Follow-up and monitoring schedules</a:t>
-            </a:r>
-          </a:p>
-          <a:p>
-            <a:pPr lvl="1" algn="just"/>
-            <a:r>
-              <a:rPr lang="en-US" sz="1800" dirty="0"/>
-              <a:t>Early childhood developmental activities</a:t>
-            </a:r>
-          </a:p>
-          <a:p>
-            <a:pPr marL="0" indent="0" algn="just">
-              <a:buNone/>
-            </a:pPr>
-            <a:endParaRPr lang="en-US" sz="1800" dirty="0"/>
-          </a:p>
-          <a:p>
-            <a:pPr marL="0" indent="0" algn="just">
-              <a:buNone/>
-            </a:pPr>
-            <a:r>
-              <a:rPr lang="en-US" sz="1800" dirty="0"/>
-              <a:t>The system is deployed through a </a:t>
-            </a:r>
-            <a:r>
-              <a:rPr lang="en-US" sz="1800" b="1" dirty="0"/>
-              <a:t>web-based interface</a:t>
-            </a:r>
-            <a:r>
-              <a:rPr lang="en-US" sz="1800" dirty="0"/>
-              <a:t>, enabling caregivers and healthcare workers to enter infant health details and instantly receive the ML-predicted risk along with AI-generated guidance.</a:t>
-            </a:r>
-          </a:p>
-          <a:p>
-            <a:pPr marL="0" indent="0" algn="just">
-              <a:buNone/>
-            </a:pPr>
-            <a:endParaRPr lang="en-US" sz="1800" dirty="0"/>
-          </a:p>
-          <a:p>
-            <a:pPr marL="0" indent="0" algn="just">
-              <a:buNone/>
-            </a:pPr>
-            <a:r>
-              <a:rPr lang="en-US" sz="1800" dirty="0"/>
-              <a:t>With a trained </a:t>
-            </a:r>
-            <a:r>
-              <a:rPr lang="en-US" sz="1800" b="1" dirty="0"/>
-              <a:t>CatBoostClassifier</a:t>
-            </a:r>
-            <a:r>
-              <a:rPr lang="en-US" sz="1800" dirty="0"/>
-              <a:t> model powering risk prediction and a robust GPT engine generating structured survival plans, the system demonstrates strong potential to enhance pediatric care through </a:t>
-            </a:r>
-            <a:r>
-              <a:rPr lang="en-US" sz="1800" b="1" dirty="0"/>
-              <a:t>data-driven decision support and intelligent recommendation generation</a:t>
-            </a:r>
-            <a:r>
-              <a:rPr lang="en-US" sz="1800" dirty="0"/>
-              <a:t>.</a:t>
-            </a:r>
-          </a:p>
-          <a:p>
-            <a:pPr marL="0" indent="0">
-              <a:buNone/>
-            </a:pPr>
-            <a:endParaRPr lang="en-US" sz="1800" dirty="0"/>
-          </a:p>
-        </p:txBody>
-      </p:sp>
+              <a:t>– Protects user data and prevents unauthorized access</a:t>
+            </a:r>
+          </a:p>
+        </p:txBody>
+      </p:sp>
+      <p:pic>
+        <p:nvPicPr>
+          <p:cNvPr id="10" name="Picture 9">
+            <a:extLst>
+              <a:ext uri="{FF2B5EF4-FFF2-40B4-BE49-F238E27FC236}">
+                <a16:creationId xmlns:a16="http://schemas.microsoft.com/office/drawing/2014/main" id="{87EF3497-B219-4D95-B208-A6C640D6B1D3}"/>
+              </a:ext>
+            </a:extLst>
+          </p:cNvPr>
+          <p:cNvPicPr>
+            <a:picLocks noChangeAspect="1"/>
+          </p:cNvPicPr>
+          <p:nvPr/>
+        </p:nvPicPr>
+        <p:blipFill rotWithShape="1">
+          <a:blip r:embed="rId2"/>
+          <a:srcRect l="3473" t="27725" r="3473" b="3044"/>
+          <a:stretch/>
+        </p:blipFill>
+        <p:spPr>
+          <a:xfrm>
+            <a:off x="2590800" y="4343400"/>
+            <a:ext cx="3962400" cy="1905000"/>
+          </a:xfrm>
+          <a:prstGeom prst="rect">
+            <a:avLst/>
+          </a:prstGeom>
+        </p:spPr>
+      </p:pic>
     </p:spTree>
     <p:extLst>
       <p:ext uri="{BB962C8B-B14F-4D97-AF65-F5344CB8AC3E}">
-        <p14:creationId xmlns:p14="http://schemas.microsoft.com/office/powerpoint/2010/main" val="352254826"/>
+        <p14:creationId xmlns:p14="http://schemas.microsoft.com/office/powerpoint/2010/main" val="2677549278"/>
       </p:ext>
     </p:extLst>
   </p:cSld>
@@ -5345,10 +6694,10 @@
       </p:grpSpPr>
       <p:sp>
         <p:nvSpPr>
-          <p:cNvPr id="4" name="Title 3">
+          <p:cNvPr id="2" name="Title 1">
             <a:extLst>
               <a:ext uri="{FF2B5EF4-FFF2-40B4-BE49-F238E27FC236}">
-                <a16:creationId xmlns:a16="http://schemas.microsoft.com/office/drawing/2014/main" id="{D400438B-4076-4371-A75D-5A001F4C52F9}"/>
+                <a16:creationId xmlns:a16="http://schemas.microsoft.com/office/drawing/2014/main" id="{82905BA2-A14A-48C0-BE11-5F40595EC518}"/>
               </a:ext>
             </a:extLst>
           </p:cNvPr>
@@ -5376,10 +6725,10 @@
       </p:sp>
       <p:sp>
         <p:nvSpPr>
-          <p:cNvPr id="5" name="Content Placeholder 4">
+          <p:cNvPr id="3" name="Content Placeholder 2">
             <a:extLst>
               <a:ext uri="{FF2B5EF4-FFF2-40B4-BE49-F238E27FC236}">
-                <a16:creationId xmlns:a16="http://schemas.microsoft.com/office/drawing/2014/main" id="{F1878A1C-BB4A-4287-B747-B166DA06F721}"/>
+                <a16:creationId xmlns:a16="http://schemas.microsoft.com/office/drawing/2014/main" id="{ED34B578-ECAE-4DCE-ADD3-AD8B72871F83}"/>
               </a:ext>
             </a:extLst>
           </p:cNvPr>
@@ -5387,270 +6736,128 @@
             <a:spLocks noGrp="1"/>
           </p:cNvSpPr>
           <p:nvPr>
-            <p:ph sz="half" idx="1"/>
+            <p:ph idx="1"/>
           </p:nvPr>
         </p:nvSpPr>
         <p:spPr>
           <a:xfrm>
             <a:off x="457200" y="1219200"/>
-            <a:ext cx="4038600" cy="5364162"/>
+            <a:ext cx="8229600" cy="4906963"/>
           </a:xfrm>
         </p:spPr>
         <p:txBody>
           <a:bodyPr>
-            <a:normAutofit lnSpcReduction="10000"/>
+            <a:normAutofit/>
           </a:bodyPr>
           <a:lstStyle/>
           <a:p>
-            <a:pPr>
+            <a:pPr algn="just"/>
+            <a:r>
+              <a:rPr lang="en-US" sz="2000" b="1" dirty="0"/>
+              <a:t>User Interface &amp; Input Collection Module</a:t>
+            </a:r>
+          </a:p>
+          <a:p>
+            <a:pPr lvl="1" algn="just"/>
+            <a:r>
+              <a:rPr lang="en-US" sz="1800" dirty="0"/>
+              <a:t>Delivers an interactive interface for entering infant details and viewing prediction results.</a:t>
+            </a:r>
+          </a:p>
+          <a:p>
+            <a:pPr marL="457200" lvl="1" indent="0" algn="just">
+              <a:buNone/>
+            </a:pPr>
+            <a:r>
+              <a:rPr lang="en-US" sz="1900" b="1" dirty="0"/>
+              <a:t>Key Functionalities:</a:t>
+            </a:r>
+          </a:p>
+          <a:p>
+            <a:pPr lvl="1" algn="just">
               <a:buFont typeface="Wingdings" panose="05000000000000000000" pitchFamily="2" charset="2"/>
-              <a:buChar char="Ø"/>
+              <a:buChar char="ü"/>
             </a:pPr>
             <a:r>
               <a:rPr lang="en-US" sz="1800" b="1" dirty="0"/>
-              <a:t>Data Preprocessing Module</a:t>
-            </a:r>
-          </a:p>
-          <a:p>
-            <a:pPr lvl="1"/>
-            <a:r>
-              <a:rPr lang="en-US" sz="1600" dirty="0"/>
-              <a:t>Dataset loaded and cleaned</a:t>
-            </a:r>
-          </a:p>
-          <a:p>
-            <a:pPr lvl="1"/>
-            <a:r>
-              <a:rPr lang="en-US" sz="1600" dirty="0"/>
-              <a:t>Class imbalance handled using SMOTE</a:t>
-            </a:r>
-          </a:p>
-          <a:p>
-            <a:pPr lvl="1"/>
-            <a:r>
-              <a:rPr lang="en-US" sz="1600" dirty="0"/>
-              <a:t>Train-test split prepared</a:t>
-            </a:r>
-          </a:p>
-          <a:p>
-            <a:pPr marL="0" indent="0">
-              <a:buNone/>
+              <a:t>Input Collection </a:t>
+            </a:r>
+            <a:r>
+              <a:rPr lang="en-US" sz="1800" dirty="0"/>
+              <a:t>–Gathers birth weight, maternal age, immunization, nutrition, socioeconomic status, and prenatal visits</a:t>
+            </a:r>
+          </a:p>
+          <a:p>
+            <a:pPr lvl="1" algn="just">
+              <a:buFont typeface="Wingdings" panose="05000000000000000000" pitchFamily="2" charset="2"/>
+              <a:buChar char="ü"/>
             </a:pPr>
-            <a:endParaRPr lang="en-US" sz="1800" dirty="0"/>
-          </a:p>
-          <a:p>
-            <a:pPr>
+            <a:r>
+              <a:rPr lang="en-US" sz="1800" b="1" dirty="0"/>
+              <a:t>Responsive &amp; Modern UI </a:t>
+            </a:r>
+            <a:r>
+              <a:rPr lang="en-US" sz="1800" dirty="0"/>
+              <a:t>– Built with HTML/CSS/JS; supports dark mode and  smooth transitions</a:t>
+            </a:r>
+          </a:p>
+          <a:p>
+            <a:pPr lvl="1" algn="just">
               <a:buFont typeface="Wingdings" panose="05000000000000000000" pitchFamily="2" charset="2"/>
-              <a:buChar char="Ø"/>
+              <a:buChar char="ü"/>
             </a:pPr>
             <a:r>
               <a:rPr lang="en-US" sz="1800" b="1" dirty="0"/>
-              <a:t>Machine Learning Module</a:t>
-            </a:r>
-          </a:p>
-          <a:p>
-            <a:pPr lvl="1"/>
-            <a:r>
-              <a:rPr lang="en-US" sz="1600" dirty="0"/>
-              <a:t>Multiple ML models tested (RandomForest, XGBoost etc..)</a:t>
-            </a:r>
-          </a:p>
-          <a:p>
-            <a:pPr lvl="1"/>
-            <a:r>
-              <a:rPr lang="en-US" sz="1600" dirty="0"/>
-              <a:t>CatBoost selected as best performer (Accuracy: 0.8746, highest among all)</a:t>
-            </a:r>
-          </a:p>
-          <a:p>
-            <a:pPr lvl="1"/>
-            <a:r>
-              <a:rPr lang="en-US" sz="1600" dirty="0"/>
-              <a:t>Final model exported as model.pkl</a:t>
-            </a:r>
-          </a:p>
-          <a:p>
-            <a:pPr marL="0" indent="0">
-              <a:buNone/>
-            </a:pPr>
-            <a:endParaRPr lang="en-US" sz="1800" dirty="0"/>
-          </a:p>
-          <a:p>
-            <a:pPr>
-              <a:buFont typeface="Wingdings" panose="05000000000000000000" pitchFamily="2" charset="2"/>
-              <a:buChar char="Ø"/>
-            </a:pPr>
-            <a:r>
-              <a:rPr lang="en-US" sz="1800" b="1" dirty="0"/>
-              <a:t>Model Evaluation Module</a:t>
-            </a:r>
-          </a:p>
-          <a:p>
-            <a:pPr lvl="1"/>
-            <a:r>
-              <a:rPr lang="en-US" sz="1600" dirty="0"/>
-              <a:t>Accuracy and metrics evaluated </a:t>
-            </a:r>
-          </a:p>
-          <a:p>
-            <a:pPr lvl="1"/>
-            <a:r>
-              <a:rPr lang="en-US" sz="1600" dirty="0"/>
-              <a:t>Confusion matrix and performance observed</a:t>
-            </a:r>
-          </a:p>
-          <a:p>
-            <a:pPr lvl="1"/>
-            <a:r>
-              <a:rPr lang="en-US" sz="1600" dirty="0"/>
-              <a:t>Best model validated on held-out test data</a:t>
-            </a:r>
-          </a:p>
-        </p:txBody>
-      </p:sp>
-      <p:sp>
-        <p:nvSpPr>
-          <p:cNvPr id="6" name="Content Placeholder 5">
+              <a:t>Real-Time Results Display </a:t>
+            </a:r>
+            <a:r>
+              <a:rPr lang="en-US" sz="1800" dirty="0"/>
+              <a:t>– Shows probability meter, risk category, and survival plan</a:t>
+            </a:r>
+            <a:endParaRPr lang="en-US" sz="2000" dirty="0"/>
+          </a:p>
+        </p:txBody>
+      </p:sp>
+      <p:pic>
+        <p:nvPicPr>
+          <p:cNvPr id="9" name="Picture 8">
             <a:extLst>
               <a:ext uri="{FF2B5EF4-FFF2-40B4-BE49-F238E27FC236}">
-                <a16:creationId xmlns:a16="http://schemas.microsoft.com/office/drawing/2014/main" id="{B3CEFDC0-2046-4785-822C-858408F91561}"/>
+                <a16:creationId xmlns:a16="http://schemas.microsoft.com/office/drawing/2014/main" id="{BCFA4499-D08C-4FB4-A8B5-6B76D497AFA7}"/>
               </a:ext>
             </a:extLst>
           </p:cNvPr>
-          <p:cNvSpPr>
-            <a:spLocks noGrp="1"/>
-          </p:cNvSpPr>
-          <p:nvPr>
-            <p:ph sz="half" idx="2"/>
-          </p:nvPr>
-        </p:nvSpPr>
+          <p:cNvPicPr>
+            <a:picLocks noChangeAspect="1"/>
+          </p:cNvPicPr>
+          <p:nvPr/>
+        </p:nvPicPr>
+        <p:blipFill>
+          <a:blip r:embed="rId2" cstate="print">
+            <a:extLst>
+              <a:ext uri="{28A0092B-C50C-407E-A947-70E740481C1C}">
+                <a14:useLocalDpi xmlns:a14="http://schemas.microsoft.com/office/drawing/2010/main" val="0"/>
+              </a:ext>
+            </a:extLst>
+          </a:blip>
+          <a:stretch>
+            <a:fillRect/>
+          </a:stretch>
+        </p:blipFill>
         <p:spPr>
           <a:xfrm>
-            <a:off x="4648200" y="1219200"/>
-            <a:ext cx="4038600" cy="5364162"/>
+            <a:off x="2628900" y="4419600"/>
+            <a:ext cx="3886200" cy="2068969"/>
           </a:xfrm>
+          <a:prstGeom prst="rect">
+            <a:avLst/>
+          </a:prstGeom>
         </p:spPr>
-        <p:txBody>
-          <a:bodyPr>
-            <a:normAutofit lnSpcReduction="10000"/>
-          </a:bodyPr>
-          <a:lstStyle/>
-          <a:p>
-            <a:pPr>
-              <a:buFont typeface="Wingdings" panose="05000000000000000000" pitchFamily="2" charset="2"/>
-              <a:buChar char="Ø"/>
-            </a:pPr>
-            <a:r>
-              <a:rPr lang="en-US" sz="1800" b="1" dirty="0"/>
-              <a:t>AI Survival Plan Generator Module</a:t>
-            </a:r>
-          </a:p>
-          <a:p>
-            <a:pPr lvl="1"/>
-            <a:r>
-              <a:rPr lang="en-US" sz="1600" dirty="0"/>
-              <a:t>Full HuggingFace GPT integration</a:t>
-            </a:r>
-          </a:p>
-          <a:p>
-            <a:pPr lvl="1"/>
-            <a:r>
-              <a:rPr lang="en-US" sz="1600" dirty="0"/>
-              <a:t>Custom Prompt Engineering</a:t>
-            </a:r>
-          </a:p>
-          <a:p>
-            <a:pPr lvl="1"/>
-            <a:r>
-              <a:rPr lang="en-US" sz="1600" dirty="0"/>
-              <a:t>Generates Personalized, year-wise survival plans (0-5 years)</a:t>
-            </a:r>
-          </a:p>
-          <a:p>
-            <a:pPr lvl="1"/>
-            <a:endParaRPr lang="en-US" sz="1800" dirty="0"/>
-          </a:p>
-          <a:p>
-            <a:pPr>
-              <a:buFont typeface="Wingdings" panose="05000000000000000000" pitchFamily="2" charset="2"/>
-              <a:buChar char="Ø"/>
-            </a:pPr>
-            <a:r>
-              <a:rPr lang="en-US" sz="1800" b="1" dirty="0"/>
-              <a:t>Backend API Module</a:t>
-            </a:r>
-          </a:p>
-          <a:p>
-            <a:pPr lvl="1"/>
-            <a:r>
-              <a:rPr lang="en-US" sz="1600" dirty="0"/>
-              <a:t>Implemented with Flask</a:t>
-            </a:r>
-          </a:p>
-          <a:p>
-            <a:pPr lvl="1"/>
-            <a:r>
-              <a:rPr lang="en-US" sz="1600" dirty="0"/>
-              <a:t>Endpoints: /api/predict, /predict, /generate-plan</a:t>
-            </a:r>
-          </a:p>
-          <a:p>
-            <a:pPr lvl="1"/>
-            <a:r>
-              <a:rPr lang="en-US" sz="1600" dirty="0"/>
-              <a:t>Manages full inference pipeline:     ML prediction → GPT plan → UI flow</a:t>
-            </a:r>
-          </a:p>
-          <a:p>
-            <a:pPr marL="0" indent="0">
-              <a:buNone/>
-            </a:pPr>
-            <a:endParaRPr lang="en-US" sz="1800" dirty="0"/>
-          </a:p>
-          <a:p>
-            <a:pPr>
-              <a:buFont typeface="Wingdings" panose="05000000000000000000" pitchFamily="2" charset="2"/>
-              <a:buChar char="Ø"/>
-            </a:pPr>
-            <a:r>
-              <a:rPr lang="en-US" sz="1800" b="1" dirty="0"/>
-              <a:t>User Interface Module</a:t>
-            </a:r>
-          </a:p>
-          <a:p>
-            <a:pPr lvl="1"/>
-            <a:r>
-              <a:rPr lang="en-US" sz="1600" dirty="0"/>
-              <a:t>web UI built with HTML, CSS, JavaScript</a:t>
-            </a:r>
-          </a:p>
-          <a:p>
-            <a:pPr lvl="1"/>
-            <a:r>
-              <a:rPr lang="en-US" sz="1600" dirty="0"/>
-              <a:t>Collects infant health inputs from user</a:t>
-            </a:r>
-          </a:p>
-          <a:p>
-            <a:pPr lvl="1"/>
-            <a:r>
-              <a:rPr lang="en-US" sz="1600" dirty="0"/>
-              <a:t>Displays risk score, probability meter, and AI-generated plan</a:t>
-            </a:r>
-          </a:p>
-          <a:p>
-            <a:pPr>
-              <a:buFont typeface="Wingdings" panose="05000000000000000000" pitchFamily="2" charset="2"/>
-              <a:buChar char="Ø"/>
-            </a:pPr>
-            <a:endParaRPr lang="en-US" sz="1800" dirty="0"/>
-          </a:p>
-        </p:txBody>
-      </p:sp>
+      </p:pic>
     </p:spTree>
     <p:extLst>
       <p:ext uri="{BB962C8B-B14F-4D97-AF65-F5344CB8AC3E}">
-        <p14:creationId xmlns:p14="http://schemas.microsoft.com/office/powerpoint/2010/main" val="524150428"/>
+        <p14:creationId xmlns:p14="http://schemas.microsoft.com/office/powerpoint/2010/main" val="1774091827"/>
       </p:ext>
     </p:extLst>
   </p:cSld>
@@ -5682,7 +6889,7 @@
           <p:cNvPr id="2" name="Title 1">
             <a:extLst>
               <a:ext uri="{FF2B5EF4-FFF2-40B4-BE49-F238E27FC236}">
-                <a16:creationId xmlns:a16="http://schemas.microsoft.com/office/drawing/2014/main" id="{791FBF50-3D8A-43EE-9464-1B53C6B2470F}"/>
+                <a16:creationId xmlns:a16="http://schemas.microsoft.com/office/drawing/2014/main" id="{8E9BA2EC-8337-4F70-A4C4-129B51250F57}"/>
               </a:ext>
             </a:extLst>
           </p:cNvPr>
@@ -5695,160 +6902,170 @@
         </p:nvSpPr>
         <p:spPr/>
         <p:txBody>
+          <a:bodyPr/>
+          <a:lstStyle/>
+          <a:p>
+            <a:r>
+              <a:rPr lang="en-US" dirty="0">
+                <a:latin typeface="Times New Roman" panose="02020603050405020304" pitchFamily="18" charset="0"/>
+                <a:cs typeface="Times New Roman" panose="02020603050405020304" pitchFamily="18" charset="0"/>
+              </a:rPr>
+              <a:t>Modules</a:t>
+            </a:r>
+          </a:p>
+        </p:txBody>
+      </p:sp>
+      <p:sp>
+        <p:nvSpPr>
+          <p:cNvPr id="3" name="Content Placeholder 2">
+            <a:extLst>
+              <a:ext uri="{FF2B5EF4-FFF2-40B4-BE49-F238E27FC236}">
+                <a16:creationId xmlns:a16="http://schemas.microsoft.com/office/drawing/2014/main" id="{39ACEC0E-A92D-4CB9-BAC6-2F68777DF903}"/>
+              </a:ext>
+            </a:extLst>
+          </p:cNvPr>
+          <p:cNvSpPr>
+            <a:spLocks noGrp="1"/>
+          </p:cNvSpPr>
+          <p:nvPr>
+            <p:ph idx="1"/>
+          </p:nvPr>
+        </p:nvSpPr>
+        <p:spPr>
+          <a:xfrm>
+            <a:off x="439994" y="1166018"/>
+            <a:ext cx="8229600" cy="4525963"/>
+          </a:xfrm>
+        </p:spPr>
+        <p:txBody>
           <a:bodyPr>
             <a:normAutofit/>
           </a:bodyPr>
           <a:lstStyle/>
           <a:p>
-            <a:r>
-              <a:rPr kumimoji="0" lang="en-US" sz="4400" b="0" i="0" u="none" strike="noStrike" kern="1200" cap="none" spc="0" normalizeH="0" baseline="0" noProof="0" dirty="0">
-                <a:ln>
-                  <a:noFill/>
-                </a:ln>
-                <a:solidFill>
-                  <a:schemeClr val="tx1"/>
-                </a:solidFill>
-                <a:effectLst/>
-                <a:uLnTx/>
-                <a:uFillTx/>
-                <a:latin typeface="Times New Roman" pitchFamily="18" charset="0"/>
-                <a:ea typeface="+mj-ea"/>
-                <a:cs typeface="Times New Roman" pitchFamily="18" charset="0"/>
-              </a:rPr>
-              <a:t>Technological</a:t>
-            </a:r>
-            <a:r>
-              <a:rPr kumimoji="0" lang="en-US" sz="4400" b="0" i="0" u="none" strike="noStrike" kern="1200" cap="none" spc="0" normalizeH="0" noProof="0" dirty="0">
-                <a:ln>
-                  <a:noFill/>
-                </a:ln>
-                <a:solidFill>
-                  <a:schemeClr val="tx1"/>
-                </a:solidFill>
-                <a:effectLst/>
-                <a:uLnTx/>
-                <a:uFillTx/>
-                <a:latin typeface="Times New Roman" pitchFamily="18" charset="0"/>
-                <a:ea typeface="+mj-ea"/>
-                <a:cs typeface="Times New Roman" pitchFamily="18" charset="0"/>
-              </a:rPr>
-              <a:t> Approach</a:t>
-            </a:r>
-            <a:endParaRPr lang="en-US" dirty="0"/>
-          </a:p>
-        </p:txBody>
-      </p:sp>
-      <p:sp>
-        <p:nvSpPr>
-          <p:cNvPr id="3" name="Content Placeholder 2">
+            <a:pPr algn="just"/>
+            <a:r>
+              <a:rPr lang="en-US" sz="2000" b="1" dirty="0"/>
+              <a:t>Machine Learning Prediction Module</a:t>
+            </a:r>
+          </a:p>
+          <a:p>
+            <a:pPr lvl="1" algn="just"/>
+            <a:r>
+              <a:rPr lang="en-US" sz="1800" dirty="0"/>
+              <a:t>Generates accurate risk predictions based on infant health parameters.</a:t>
+            </a:r>
+          </a:p>
+          <a:p>
+            <a:pPr marL="457200" lvl="1" indent="0" algn="just">
+              <a:buNone/>
+            </a:pPr>
+            <a:r>
+              <a:rPr lang="en-US" sz="1900" b="1" dirty="0"/>
+              <a:t>Key Functionalities:</a:t>
+            </a:r>
+          </a:p>
+          <a:p>
+            <a:pPr lvl="1" algn="just">
+              <a:buFont typeface="Wingdings" panose="05000000000000000000" pitchFamily="2" charset="2"/>
+              <a:buChar char="ü"/>
+            </a:pPr>
+            <a:r>
+              <a:rPr lang="en-US" sz="1800" b="1" dirty="0"/>
+              <a:t>Input Validation </a:t>
+            </a:r>
+            <a:r>
+              <a:rPr lang="en-US" sz="1800" dirty="0"/>
+              <a:t>– Converts numeric and categorical data into ML-ready format.</a:t>
+            </a:r>
+          </a:p>
+          <a:p>
+            <a:pPr lvl="1" algn="just">
+              <a:buFont typeface="Wingdings" panose="05000000000000000000" pitchFamily="2" charset="2"/>
+              <a:buChar char="ü"/>
+            </a:pPr>
+            <a:r>
+              <a:rPr lang="en-US" sz="1800" b="1" dirty="0"/>
+              <a:t>Model Inference </a:t>
+            </a:r>
+            <a:r>
+              <a:rPr lang="en-US" sz="1800" dirty="0"/>
+              <a:t>–</a:t>
+            </a:r>
+            <a:r>
+              <a:rPr lang="en-US" sz="1800" b="1" dirty="0"/>
+              <a:t> </a:t>
+            </a:r>
+            <a:r>
+              <a:rPr lang="en-US" sz="1800" dirty="0"/>
+              <a:t>Uses the trained model (model.pkl) and produces risk probability and classification</a:t>
+            </a:r>
+          </a:p>
+          <a:p>
+            <a:pPr lvl="1" algn="just">
+              <a:buFont typeface="Wingdings" panose="05000000000000000000" pitchFamily="2" charset="2"/>
+              <a:buChar char="ü"/>
+            </a:pPr>
+            <a:r>
+              <a:rPr lang="en-US" sz="1800" b="1" dirty="0"/>
+              <a:t>Optimized Pipeline </a:t>
+            </a:r>
+            <a:r>
+              <a:rPr lang="en-US" sz="1800" dirty="0"/>
+              <a:t>– Fast prediction with pre-loaded model.pkl</a:t>
+            </a:r>
+          </a:p>
+          <a:p>
+            <a:pPr lvl="1" algn="just">
+              <a:buFont typeface="Wingdings" panose="05000000000000000000" pitchFamily="2" charset="2"/>
+              <a:buChar char="ü"/>
+            </a:pPr>
+            <a:r>
+              <a:rPr lang="en-US" sz="1800" b="1" dirty="0"/>
+              <a:t>Results </a:t>
+            </a:r>
+            <a:r>
+              <a:rPr lang="en-US" sz="1800" dirty="0"/>
+              <a:t>– Probability, Risk category for frontend display</a:t>
+            </a:r>
+            <a:endParaRPr lang="en-US" sz="1800" b="1" dirty="0"/>
+          </a:p>
+        </p:txBody>
+      </p:sp>
+      <p:pic>
+        <p:nvPicPr>
+          <p:cNvPr id="7" name="Picture 6">
             <a:extLst>
               <a:ext uri="{FF2B5EF4-FFF2-40B4-BE49-F238E27FC236}">
-                <a16:creationId xmlns:a16="http://schemas.microsoft.com/office/drawing/2014/main" id="{6D91B9A2-128E-4E7D-84F3-B11D95555CD7}"/>
+                <a16:creationId xmlns:a16="http://schemas.microsoft.com/office/drawing/2014/main" id="{307346DD-B359-4F2B-B93F-E34CF23F04B4}"/>
               </a:ext>
             </a:extLst>
           </p:cNvPr>
-          <p:cNvSpPr>
-            <a:spLocks noGrp="1"/>
-          </p:cNvSpPr>
-          <p:nvPr>
-            <p:ph idx="1"/>
-          </p:nvPr>
-        </p:nvSpPr>
-        <p:spPr/>
-        <p:txBody>
-          <a:bodyPr>
-            <a:normAutofit/>
-          </a:bodyPr>
-          <a:lstStyle/>
-          <a:p>
-            <a:pPr algn="just"/>
-            <a:r>
-              <a:rPr lang="en-US" sz="1800" b="1" dirty="0"/>
-              <a:t>Machine Learning Layer</a:t>
-            </a:r>
-          </a:p>
-          <a:p>
-            <a:pPr lvl="1" algn="just"/>
-            <a:r>
-              <a:rPr lang="en-US" sz="1700" dirty="0"/>
-              <a:t>Dataset cleaned, balanced using SMOTE</a:t>
-            </a:r>
-          </a:p>
-          <a:p>
-            <a:pPr lvl="1" algn="just"/>
-            <a:r>
-              <a:rPr lang="en-US" sz="1700" dirty="0"/>
-              <a:t>Multiple models trained (RF, XGB, LGBM, CatBoost, Logistic Regression)</a:t>
-            </a:r>
-          </a:p>
-          <a:p>
-            <a:pPr lvl="1" algn="just"/>
-            <a:r>
-              <a:rPr lang="en-US" sz="1700" dirty="0"/>
-              <a:t>Performance evaluated using Accuracy &amp; ROC-AUC</a:t>
-            </a:r>
-          </a:p>
-          <a:p>
-            <a:pPr lvl="1" algn="just"/>
-            <a:r>
-              <a:rPr lang="en-US" sz="1700" dirty="0"/>
-              <a:t>CatBoost Classifier selected as best model (Accuracy: 0.8746)</a:t>
-            </a:r>
-          </a:p>
-          <a:p>
-            <a:pPr lvl="1" algn="just"/>
-            <a:r>
-              <a:rPr lang="en-US" sz="1700" dirty="0"/>
-              <a:t>Final model saved as model.pkl for inference</a:t>
-            </a:r>
-          </a:p>
-          <a:p>
-            <a:pPr marL="457200" lvl="1" indent="0" algn="just">
-              <a:buNone/>
-            </a:pPr>
-            <a:endParaRPr lang="en-US" sz="1400" dirty="0"/>
-          </a:p>
-          <a:p>
-            <a:pPr algn="just"/>
-            <a:r>
-              <a:rPr lang="en-US" sz="1800" b="1" dirty="0"/>
-              <a:t>AI Guidance Layer</a:t>
-            </a:r>
-          </a:p>
-          <a:p>
-            <a:pPr lvl="1" algn="just"/>
-            <a:r>
-              <a:rPr lang="en-US" sz="1700" dirty="0"/>
-              <a:t>Integrated HuggingFace GPT for generating personalized survival plans</a:t>
-            </a:r>
-          </a:p>
-          <a:p>
-            <a:pPr lvl="1" algn="just"/>
-            <a:r>
-              <a:rPr lang="en-US" sz="1700" dirty="0"/>
-              <a:t>Structured prompt engineering using infant health features</a:t>
-            </a:r>
-          </a:p>
-          <a:p>
-            <a:pPr lvl="1" algn="just"/>
-            <a:r>
-              <a:rPr lang="en-US" sz="1700" dirty="0"/>
-              <a:t>Output parsed into Year-wise actionable steps (0-5 years)</a:t>
-            </a:r>
-          </a:p>
-          <a:p>
-            <a:pPr lvl="1" algn="just"/>
-            <a:r>
-              <a:rPr lang="en-US" sz="1700" dirty="0"/>
-              <a:t>Fallback system provided for API Failure or issues</a:t>
-            </a:r>
-          </a:p>
-        </p:txBody>
-      </p:sp>
+          <p:cNvPicPr>
+            <a:picLocks noChangeAspect="1"/>
+          </p:cNvPicPr>
+          <p:nvPr/>
+        </p:nvPicPr>
+        <p:blipFill>
+          <a:blip r:embed="rId2"/>
+          <a:stretch>
+            <a:fillRect/>
+          </a:stretch>
+        </p:blipFill>
+        <p:spPr>
+          <a:xfrm>
+            <a:off x="741106" y="4343400"/>
+            <a:ext cx="7661788" cy="1638624"/>
+          </a:xfrm>
+          <a:prstGeom prst="rect">
+            <a:avLst/>
+          </a:prstGeom>
+        </p:spPr>
+      </p:pic>
     </p:spTree>
     <p:extLst>
       <p:ext uri="{BB962C8B-B14F-4D97-AF65-F5344CB8AC3E}">
-        <p14:creationId xmlns:p14="http://schemas.microsoft.com/office/powerpoint/2010/main" val="4189385619"/>
+        <p14:creationId xmlns:p14="http://schemas.microsoft.com/office/powerpoint/2010/main" val="3373935511"/>
       </p:ext>
     </p:extLst>
   </p:cSld>
@@ -5877,10 +7094,10 @@
       </p:grpSpPr>
       <p:sp>
         <p:nvSpPr>
-          <p:cNvPr id="4" name="Title 3">
+          <p:cNvPr id="2" name="Title 1">
             <a:extLst>
               <a:ext uri="{FF2B5EF4-FFF2-40B4-BE49-F238E27FC236}">
-                <a16:creationId xmlns:a16="http://schemas.microsoft.com/office/drawing/2014/main" id="{8E8DC362-A41F-47DE-A381-45FF95D3DFD7}"/>
+                <a16:creationId xmlns:a16="http://schemas.microsoft.com/office/drawing/2014/main" id="{003EE72A-528D-482B-90A7-A8F9E83A88A3}"/>
               </a:ext>
             </a:extLst>
           </p:cNvPr>
@@ -5897,49 +7114,21 @@
           <a:lstStyle/>
           <a:p>
             <a:r>
-              <a:rPr kumimoji="0" lang="en-US" sz="4400" b="0" i="0" u="none" strike="noStrike" kern="1200" cap="none" spc="0" normalizeH="0" baseline="0" noProof="0" dirty="0">
-                <a:ln>
-                  <a:noFill/>
-                </a:ln>
-                <a:solidFill>
-                  <a:schemeClr val="tx1"/>
-                </a:solidFill>
-                <a:effectLst/>
-                <a:uLnTx/>
-                <a:uFillTx/>
-                <a:latin typeface="Times New Roman" pitchFamily="18" charset="0"/>
-                <a:ea typeface="+mj-ea"/>
-                <a:cs typeface="Times New Roman" pitchFamily="18" charset="0"/>
+              <a:rPr lang="en-US" dirty="0">
+                <a:latin typeface="Times New Roman" panose="02020603050405020304" pitchFamily="18" charset="0"/>
+                <a:cs typeface="Times New Roman" panose="02020603050405020304" pitchFamily="18" charset="0"/>
               </a:rPr>
-              <a:t>Technological</a:t>
-            </a:r>
-            <a:r>
-              <a:rPr kumimoji="0" lang="en-US" sz="4400" b="0" i="0" u="none" strike="noStrike" kern="1200" cap="none" spc="0" normalizeH="0" noProof="0" dirty="0">
-                <a:ln>
-                  <a:noFill/>
-                </a:ln>
-                <a:solidFill>
-                  <a:schemeClr val="tx1"/>
-                </a:solidFill>
-                <a:effectLst/>
-                <a:uLnTx/>
-                <a:uFillTx/>
-                <a:latin typeface="Times New Roman" pitchFamily="18" charset="0"/>
-                <a:ea typeface="+mj-ea"/>
-                <a:cs typeface="Times New Roman" pitchFamily="18" charset="0"/>
-              </a:rPr>
-              <a:t> Approach</a:t>
-            </a:r>
-            <a:endParaRPr lang="en-US" dirty="0"/>
-          </a:p>
-        </p:txBody>
-      </p:sp>
-      <p:sp>
-        <p:nvSpPr>
-          <p:cNvPr id="5" name="Content Placeholder 4">
+              <a:t>Modules</a:t>
+            </a:r>
+          </a:p>
+        </p:txBody>
+      </p:sp>
+      <p:sp>
+        <p:nvSpPr>
+          <p:cNvPr id="3" name="Content Placeholder 2">
             <a:extLst>
               <a:ext uri="{FF2B5EF4-FFF2-40B4-BE49-F238E27FC236}">
-                <a16:creationId xmlns:a16="http://schemas.microsoft.com/office/drawing/2014/main" id="{446F69DC-51AD-4CC0-9C17-69BDE2743474}"/>
+                <a16:creationId xmlns:a16="http://schemas.microsoft.com/office/drawing/2014/main" id="{511891E5-3F8B-465D-AF96-01DC1CD8D269}"/>
               </a:ext>
             </a:extLst>
           </p:cNvPr>
@@ -5950,7 +7139,12 @@
             <p:ph idx="1"/>
           </p:nvPr>
         </p:nvSpPr>
-        <p:spPr/>
+        <p:spPr>
+          <a:xfrm>
+            <a:off x="457200" y="1417638"/>
+            <a:ext cx="8229600" cy="4525963"/>
+          </a:xfrm>
+        </p:spPr>
         <p:txBody>
           <a:bodyPr>
             <a:normAutofit/>
@@ -5959,108 +7153,111 @@
           <a:p>
             <a:pPr algn="just"/>
             <a:r>
+              <a:rPr lang="en-US" sz="2000" b="1" dirty="0"/>
+              <a:t>AI Survival Plan Generator Module</a:t>
+            </a:r>
+          </a:p>
+          <a:p>
+            <a:pPr lvl="1" algn="just"/>
+            <a:r>
+              <a:rPr lang="en-US" sz="1800" dirty="0"/>
+              <a:t>Generates a personalized, year-wise care plan (0-5 years) to reduce mortality risk using GPT-based AI guidance.</a:t>
+            </a:r>
+          </a:p>
+          <a:p>
+            <a:pPr marL="457200" lvl="1" indent="0" algn="just">
+              <a:buNone/>
+            </a:pPr>
+            <a:r>
+              <a:rPr lang="en-US" sz="1900" b="1" dirty="0"/>
+              <a:t>Key Functionalities:</a:t>
+            </a:r>
+          </a:p>
+          <a:p>
+            <a:pPr lvl="1" algn="just">
+              <a:buFont typeface="Wingdings" panose="05000000000000000000" pitchFamily="2" charset="2"/>
+              <a:buChar char="ü"/>
+            </a:pPr>
+            <a:r>
               <a:rPr lang="en-US" sz="1800" b="1" dirty="0"/>
-              <a:t>Backend Layer</a:t>
-            </a:r>
-          </a:p>
-          <a:p>
-            <a:pPr lvl="1" algn="just"/>
-            <a:r>
-              <a:rPr lang="en-US" sz="1700" dirty="0"/>
-              <a:t>Implemented using Flask</a:t>
-            </a:r>
-          </a:p>
-          <a:p>
-            <a:pPr lvl="1" algn="just"/>
-            <a:r>
-              <a:rPr lang="en-US" sz="1700" dirty="0"/>
-              <a:t>Core endpoints:</a:t>
+              <a:t>HuggingFace GPT Integration </a:t>
+            </a:r>
+            <a:r>
+              <a:rPr lang="en-US" sz="1800" dirty="0"/>
+              <a:t>– Generates 0-5 year actionable survival plans</a:t>
+            </a:r>
+          </a:p>
+          <a:p>
+            <a:pPr lvl="1" algn="just">
+              <a:buFont typeface="Wingdings" panose="05000000000000000000" pitchFamily="2" charset="2"/>
+              <a:buChar char="ü"/>
+            </a:pPr>
+            <a:r>
+              <a:rPr lang="en-US" sz="1800" b="1" dirty="0"/>
+              <a:t>Prompt Engineering </a:t>
+            </a:r>
+            <a:r>
+              <a:rPr lang="en-US" sz="1800" dirty="0"/>
+              <a:t>– Ensures output follows a fixed format </a:t>
             </a:r>
           </a:p>
           <a:p>
             <a:pPr lvl="2" algn="just"/>
             <a:r>
-              <a:rPr lang="en-US" sz="1700" dirty="0"/>
-              <a:t>/api/predict → </a:t>
-            </a:r>
-            <a:r>
-              <a:rPr lang="en-US" sz="1700" b="1" dirty="0"/>
-              <a:t>ML + GPT </a:t>
-            </a:r>
-            <a:r>
-              <a:rPr lang="en-US" sz="1700" dirty="0"/>
-              <a:t>prediction pipeline</a:t>
-            </a:r>
-          </a:p>
-          <a:p>
-            <a:pPr lvl="2" algn="just"/>
-            <a:r>
-              <a:rPr lang="en-US" sz="1700" dirty="0"/>
-              <a:t>/predict → frontend-friendly alias</a:t>
-            </a:r>
-          </a:p>
-          <a:p>
-            <a:pPr lvl="1" algn="just"/>
-            <a:r>
-              <a:rPr lang="en-US" sz="1700" dirty="0"/>
-              <a:t>Loads model.pkl, performs inference, triggers GPT, returns final structured JSON</a:t>
-            </a:r>
-          </a:p>
-          <a:p>
-            <a:pPr marL="0" indent="0" algn="just">
-              <a:buNone/>
+              <a:rPr lang="en-US" sz="1800" dirty="0"/>
+              <a:t>Year 0-1 , Year 1-2, Year 2-3, Year 3-4, Year 4-5</a:t>
+            </a:r>
+          </a:p>
+          <a:p>
+            <a:pPr lvl="1" algn="just">
+              <a:buFont typeface="Wingdings" panose="05000000000000000000" pitchFamily="2" charset="2"/>
+              <a:buChar char="ü"/>
             </a:pPr>
-            <a:endParaRPr lang="en-US" sz="1800" b="1" dirty="0"/>
-          </a:p>
-          <a:p>
-            <a:pPr algn="just"/>
             <a:r>
               <a:rPr lang="en-US" sz="1800" b="1" dirty="0"/>
-              <a:t>Frontend Layer</a:t>
-            </a:r>
-          </a:p>
-          <a:p>
-            <a:pPr lvl="1" algn="just"/>
-            <a:r>
-              <a:rPr lang="en-US" sz="1700" dirty="0"/>
-              <a:t>Basic UI built using HTML, CSS, JavaScript</a:t>
-            </a:r>
-          </a:p>
-          <a:p>
-            <a:pPr lvl="1" algn="just"/>
-            <a:r>
-              <a:rPr lang="en-US" sz="1700" b="1" dirty="0"/>
-              <a:t>Inputs:</a:t>
-            </a:r>
-            <a:r>
-              <a:rPr lang="en-US" sz="1700" dirty="0"/>
-              <a:t> birth weight, maternal age, immunization, nutrition, socioeconomic, prenatal visits</a:t>
-            </a:r>
-          </a:p>
-          <a:p>
-            <a:pPr lvl="1" algn="just"/>
-            <a:r>
-              <a:rPr lang="en-US" sz="1700" b="1" dirty="0"/>
-              <a:t>Outputs:</a:t>
-            </a:r>
-            <a:r>
-              <a:rPr lang="en-US" sz="1700" dirty="0"/>
-              <a:t> risk probability, risk category, survival plan</a:t>
-            </a:r>
-          </a:p>
-          <a:p>
-            <a:pPr lvl="1" algn="just"/>
-            <a:r>
-              <a:rPr lang="en-US" sz="1700" dirty="0"/>
-              <a:t>Integrated animations, theme toggle, and results visualization</a:t>
-            </a:r>
-          </a:p>
-        </p:txBody>
-      </p:sp>
+              <a:t>Personalized Recommendations</a:t>
+            </a:r>
+            <a:r>
+              <a:rPr lang="en-US" sz="1800" dirty="0"/>
+              <a:t> – Tailored steps based on nutrition, immunization, birth weight, maternal age, etc..</a:t>
+            </a:r>
+          </a:p>
+        </p:txBody>
+      </p:sp>
+      <p:pic>
+        <p:nvPicPr>
+          <p:cNvPr id="5" name="Picture 4">
+            <a:extLst>
+              <a:ext uri="{FF2B5EF4-FFF2-40B4-BE49-F238E27FC236}">
+                <a16:creationId xmlns:a16="http://schemas.microsoft.com/office/drawing/2014/main" id="{62772CBE-0EC7-44FD-A4B2-E08BB13B3B44}"/>
+              </a:ext>
+            </a:extLst>
+          </p:cNvPr>
+          <p:cNvPicPr>
+            <a:picLocks noChangeAspect="1"/>
+          </p:cNvPicPr>
+          <p:nvPr/>
+        </p:nvPicPr>
+        <p:blipFill>
+          <a:blip r:embed="rId2"/>
+          <a:stretch>
+            <a:fillRect/>
+          </a:stretch>
+        </p:blipFill>
+        <p:spPr>
+          <a:xfrm>
+            <a:off x="457200" y="4800600"/>
+            <a:ext cx="8229600" cy="954088"/>
+          </a:xfrm>
+          <a:prstGeom prst="rect">
+            <a:avLst/>
+          </a:prstGeom>
+        </p:spPr>
+      </p:pic>
     </p:spTree>
     <p:extLst>
       <p:ext uri="{BB962C8B-B14F-4D97-AF65-F5344CB8AC3E}">
-        <p14:creationId xmlns:p14="http://schemas.microsoft.com/office/powerpoint/2010/main" val="2112314874"/>
+        <p14:creationId xmlns:p14="http://schemas.microsoft.com/office/powerpoint/2010/main" val="1266977828"/>
       </p:ext>
     </p:extLst>
   </p:cSld>
@@ -6351,4 +7548,299 @@
   <a:objectDefaults/>
   <a:extraClrSchemeLst/>
 </a:theme>
+</file>
+
+<file path=ppt/theme/theme2.xml><?xml version="1.0" encoding="utf-8"?>
+<a:theme xmlns:a="http://schemas.openxmlformats.org/drawingml/2006/main" name="Office Theme">
+  <a:themeElements>
+    <a:clrScheme name="Office">
+      <a:dk1>
+        <a:sysClr val="windowText" lastClr="000000"/>
+      </a:dk1>
+      <a:lt1>
+        <a:sysClr val="window" lastClr="FFFFFF"/>
+      </a:lt1>
+      <a:dk2>
+        <a:srgbClr val="44546A"/>
+      </a:dk2>
+      <a:lt2>
+        <a:srgbClr val="E7E6E6"/>
+      </a:lt2>
+      <a:accent1>
+        <a:srgbClr val="4472C4"/>
+      </a:accent1>
+      <a:accent2>
+        <a:srgbClr val="ED7D31"/>
+      </a:accent2>
+      <a:accent3>
+        <a:srgbClr val="A5A5A5"/>
+      </a:accent3>
+      <a:accent4>
+        <a:srgbClr val="FFC000"/>
+      </a:accent4>
+      <a:accent5>
+        <a:srgbClr val="5B9BD5"/>
+      </a:accent5>
+      <a:accent6>
+        <a:srgbClr val="70AD47"/>
+      </a:accent6>
+      <a:hlink>
+        <a:srgbClr val="0563C1"/>
+      </a:hlink>
+      <a:folHlink>
+        <a:srgbClr val="954F72"/>
+      </a:folHlink>
+    </a:clrScheme>
+    <a:fontScheme name="Office">
+      <a:majorFont>
+        <a:latin typeface="Calibri Light" panose="020F0302020204030204"/>
+        <a:ea typeface=""/>
+        <a:cs typeface=""/>
+        <a:font script="Jpan" typeface="游ゴシック Light"/>
+        <a:font script="Hang" typeface="맑은 고딕"/>
+        <a:font script="Hans" typeface="等线 Light"/>
+        <a:font script="Hant" typeface="新細明體"/>
+        <a:font script="Arab" typeface="Times New Roman"/>
+        <a:font script="Hebr" typeface="Times New Roman"/>
+        <a:font script="Thai" typeface="Angsana New"/>
+        <a:font script="Ethi" typeface="Nyala"/>
+        <a:font script="Beng" typeface="Vrinda"/>
+        <a:font script="Gujr" typeface="Shruti"/>
+        <a:font script="Khmr" typeface="MoolBoran"/>
+        <a:font script="Knda" typeface="Tunga"/>
+        <a:font script="Guru" typeface="Raavi"/>
+        <a:font script="Cans" typeface="Euphemia"/>
+        <a:font script="Cher" typeface="Plantagenet Cherokee"/>
+        <a:font script="Yiii" typeface="Microsoft Yi Baiti"/>
+        <a:font script="Tibt" typeface="Microsoft Himalaya"/>
+        <a:font script="Thaa" typeface="MV Boli"/>
+        <a:font script="Deva" typeface="Mangal"/>
+        <a:font script="Telu" typeface="Gautami"/>
+        <a:font script="Taml" typeface="Latha"/>
+        <a:font script="Syrc" typeface="Estrangelo Edessa"/>
+        <a:font script="Orya" typeface="Kalinga"/>
+        <a:font script="Mlym" typeface="Kartika"/>
+        <a:font script="Laoo" typeface="DokChampa"/>
+        <a:font script="Sinh" typeface="Iskoola Pota"/>
+        <a:font script="Mong" typeface="Mongolian Baiti"/>
+        <a:font script="Viet" typeface="Times New Roman"/>
+        <a:font script="Uigh" typeface="Microsoft Uighur"/>
+        <a:font script="Geor" typeface="Sylfaen"/>
+        <a:font script="Armn" typeface="Arial"/>
+        <a:font script="Bugi" typeface="Leelawadee UI"/>
+        <a:font script="Bopo" typeface="Microsoft JhengHei"/>
+        <a:font script="Java" typeface="Javanese Text"/>
+        <a:font script="Lisu" typeface="Segoe UI"/>
+        <a:font script="Mymr" typeface="Myanmar Text"/>
+        <a:font script="Nkoo" typeface="Ebrima"/>
+        <a:font script="Olck" typeface="Nirmala UI"/>
+        <a:font script="Osma" typeface="Ebrima"/>
+        <a:font script="Phag" typeface="Phagspa"/>
+        <a:font script="Syrn" typeface="Estrangelo Edessa"/>
+        <a:font script="Syrj" typeface="Estrangelo Edessa"/>
+        <a:font script="Syre" typeface="Estrangelo Edessa"/>
+        <a:font script="Sora" typeface="Nirmala UI"/>
+        <a:font script="Tale" typeface="Microsoft Tai Le"/>
+        <a:font script="Talu" typeface="Microsoft New Tai Lue"/>
+        <a:font script="Tfng" typeface="Ebrima"/>
+      </a:majorFont>
+      <a:minorFont>
+        <a:latin typeface="Calibri" panose="020F0502020204030204"/>
+        <a:ea typeface=""/>
+        <a:cs typeface=""/>
+        <a:font script="Jpan" typeface="游ゴシック"/>
+        <a:font script="Hang" typeface="맑은 고딕"/>
+        <a:font script="Hans" typeface="等线"/>
+        <a:font script="Hant" typeface="新細明體"/>
+        <a:font script="Arab" typeface="Arial"/>
+        <a:font script="Hebr" typeface="Arial"/>
+        <a:font script="Thai" typeface="Cordia New"/>
+        <a:font script="Ethi" typeface="Nyala"/>
+        <a:font script="Beng" typeface="Vrinda"/>
+        <a:font script="Gujr" typeface="Shruti"/>
+        <a:font script="Khmr" typeface="DaunPenh"/>
+        <a:font script="Knda" typeface="Tunga"/>
+        <a:font script="Guru" typeface="Raavi"/>
+        <a:font script="Cans" typeface="Euphemia"/>
+        <a:font script="Cher" typeface="Plantagenet Cherokee"/>
+        <a:font script="Yiii" typeface="Microsoft Yi Baiti"/>
+        <a:font script="Tibt" typeface="Microsoft Himalaya"/>
+        <a:font script="Thaa" typeface="MV Boli"/>
+        <a:font script="Deva" typeface="Mangal"/>
+        <a:font script="Telu" typeface="Gautami"/>
+        <a:font script="Taml" typeface="Latha"/>
+        <a:font script="Syrc" typeface="Estrangelo Edessa"/>
+        <a:font script="Orya" typeface="Kalinga"/>
+        <a:font script="Mlym" typeface="Kartika"/>
+        <a:font script="Laoo" typeface="DokChampa"/>
+        <a:font script="Sinh" typeface="Iskoola Pota"/>
+        <a:font script="Mong" typeface="Mongolian Baiti"/>
+        <a:font script="Viet" typeface="Arial"/>
+        <a:font script="Uigh" typeface="Microsoft Uighur"/>
+        <a:font script="Geor" typeface="Sylfaen"/>
+        <a:font script="Armn" typeface="Arial"/>
+        <a:font script="Bugi" typeface="Leelawadee UI"/>
+        <a:font script="Bopo" typeface="Microsoft JhengHei"/>
+        <a:font script="Java" typeface="Javanese Text"/>
+        <a:font script="Lisu" typeface="Segoe UI"/>
+        <a:font script="Mymr" typeface="Myanmar Text"/>
+        <a:font script="Nkoo" typeface="Ebrima"/>
+        <a:font script="Olck" typeface="Nirmala UI"/>
+        <a:font script="Osma" typeface="Ebrima"/>
+        <a:font script="Phag" typeface="Phagspa"/>
+        <a:font script="Syrn" typeface="Estrangelo Edessa"/>
+        <a:font script="Syrj" typeface="Estrangelo Edessa"/>
+        <a:font script="Syre" typeface="Estrangelo Edessa"/>
+        <a:font script="Sora" typeface="Nirmala UI"/>
+        <a:font script="Tale" typeface="Microsoft Tai Le"/>
+        <a:font script="Talu" typeface="Microsoft New Tai Lue"/>
+        <a:font script="Tfng" typeface="Ebrima"/>
+      </a:minorFont>
+    </a:fontScheme>
+    <a:fmtScheme name="Office">
+      <a:fillStyleLst>
+        <a:solidFill>
+          <a:schemeClr val="phClr"/>
+        </a:solidFill>
+        <a:gradFill rotWithShape="1">
+          <a:gsLst>
+            <a:gs pos="0">
+              <a:schemeClr val="phClr">
+                <a:lumMod val="110000"/>
+                <a:satMod val="105000"/>
+                <a:tint val="67000"/>
+              </a:schemeClr>
+            </a:gs>
+            <a:gs pos="50000">
+              <a:schemeClr val="phClr">
+                <a:lumMod val="105000"/>
+                <a:satMod val="103000"/>
+                <a:tint val="73000"/>
+              </a:schemeClr>
+            </a:gs>
+            <a:gs pos="100000">
+              <a:schemeClr val="phClr">
+                <a:lumMod val="105000"/>
+                <a:satMod val="109000"/>
+                <a:tint val="81000"/>
+              </a:schemeClr>
+            </a:gs>
+          </a:gsLst>
+          <a:lin ang="5400000" scaled="0"/>
+        </a:gradFill>
+        <a:gradFill rotWithShape="1">
+          <a:gsLst>
+            <a:gs pos="0">
+              <a:schemeClr val="phClr">
+                <a:satMod val="103000"/>
+                <a:lumMod val="102000"/>
+                <a:tint val="94000"/>
+              </a:schemeClr>
+            </a:gs>
+            <a:gs pos="50000">
+              <a:schemeClr val="phClr">
+                <a:satMod val="110000"/>
+                <a:lumMod val="100000"/>
+                <a:shade val="100000"/>
+              </a:schemeClr>
+            </a:gs>
+            <a:gs pos="100000">
+              <a:schemeClr val="phClr">
+                <a:lumMod val="99000"/>
+                <a:satMod val="120000"/>
+                <a:shade val="78000"/>
+              </a:schemeClr>
+            </a:gs>
+          </a:gsLst>
+          <a:lin ang="5400000" scaled="0"/>
+        </a:gradFill>
+      </a:fillStyleLst>
+      <a:lnStyleLst>
+        <a:ln w="6350" cap="flat" cmpd="sng" algn="ctr">
+          <a:solidFill>
+            <a:schemeClr val="phClr"/>
+          </a:solidFill>
+          <a:prstDash val="solid"/>
+          <a:miter lim="800000"/>
+        </a:ln>
+        <a:ln w="12700" cap="flat" cmpd="sng" algn="ctr">
+          <a:solidFill>
+            <a:schemeClr val="phClr"/>
+          </a:solidFill>
+          <a:prstDash val="solid"/>
+          <a:miter lim="800000"/>
+        </a:ln>
+        <a:ln w="19050" cap="flat" cmpd="sng" algn="ctr">
+          <a:solidFill>
+            <a:schemeClr val="phClr"/>
+          </a:solidFill>
+          <a:prstDash val="solid"/>
+          <a:miter lim="800000"/>
+        </a:ln>
+      </a:lnStyleLst>
+      <a:effectStyleLst>
+        <a:effectStyle>
+          <a:effectLst/>
+        </a:effectStyle>
+        <a:effectStyle>
+          <a:effectLst/>
+        </a:effectStyle>
+        <a:effectStyle>
+          <a:effectLst>
+            <a:outerShdw blurRad="57150" dist="19050" dir="5400000" algn="ctr" rotWithShape="0">
+              <a:srgbClr val="000000">
+                <a:alpha val="63000"/>
+              </a:srgbClr>
+            </a:outerShdw>
+          </a:effectLst>
+        </a:effectStyle>
+      </a:effectStyleLst>
+      <a:bgFillStyleLst>
+        <a:solidFill>
+          <a:schemeClr val="phClr"/>
+        </a:solidFill>
+        <a:solidFill>
+          <a:schemeClr val="phClr">
+            <a:tint val="95000"/>
+            <a:satMod val="170000"/>
+          </a:schemeClr>
+        </a:solidFill>
+        <a:gradFill rotWithShape="1">
+          <a:gsLst>
+            <a:gs pos="0">
+              <a:schemeClr val="phClr">
+                <a:tint val="93000"/>
+                <a:satMod val="150000"/>
+                <a:shade val="98000"/>
+                <a:lumMod val="102000"/>
+              </a:schemeClr>
+            </a:gs>
+            <a:gs pos="50000">
+              <a:schemeClr val="phClr">
+                <a:tint val="98000"/>
+                <a:satMod val="130000"/>
+                <a:shade val="90000"/>
+                <a:lumMod val="103000"/>
+              </a:schemeClr>
+            </a:gs>
+            <a:gs pos="100000">
+              <a:schemeClr val="phClr">
+                <a:shade val="63000"/>
+                <a:satMod val="120000"/>
+              </a:schemeClr>
+            </a:gs>
+          </a:gsLst>
+          <a:lin ang="5400000" scaled="0"/>
+        </a:gradFill>
+      </a:bgFillStyleLst>
+    </a:fmtScheme>
+  </a:themeElements>
+  <a:objectDefaults/>
+  <a:extraClrSchemeLst/>
+  <a:extLst>
+    <a:ext uri="{05A4C25C-085E-4340-85A3-A5531E510DB2}">
+      <thm15:themeFamily xmlns:thm15="http://schemas.microsoft.com/office/thememl/2012/main" name="Office Theme" id="{62F939B6-93AF-4DB8-9C6B-D6C7DFDC589F}" vid="{4A3C46E8-61CC-4603-A589-7422A47A8E4A}"/>
+    </a:ext>
+  </a:extLst>
+</a:theme>
 </file>
</xml_diff>

<commit_message>
fix: Prevent data leakage by applying SMOTE only to training data after splitting in `train_model.py` and `compare_models.py`, and adds `2nd_Arch_diagram.png`.
</commit_message>
<xml_diff>
--- a/Docs/Ppt/First Review.pptx
+++ b/Docs/Ppt/First Review.pptx
@@ -223,7 +223,7 @@
           <a:p>
             <a:fld id="{53462338-1B9E-4EA2-9152-193F6A0ADA53}" type="datetimeFigureOut">
               <a:rPr lang="en-US" smtClean="0"/>
-              <a:t>12/10/2025</a:t>
+              <a:t>1/5/2026</a:t>
             </a:fld>
             <a:endParaRPr lang="en-US"/>
           </a:p>
@@ -755,7 +755,7 @@
             <a:fld id="{1D8BD707-D9CF-40AE-B4C6-C98DA3205C09}" type="datetimeFigureOut">
               <a:rPr lang="en-US" smtClean="0"/>
               <a:pPr/>
-              <a:t>12/10/2025</a:t>
+              <a:t>1/5/2026</a:t>
             </a:fld>
             <a:endParaRPr lang="en-US"/>
           </a:p>
@@ -920,7 +920,7 @@
             <a:fld id="{1D8BD707-D9CF-40AE-B4C6-C98DA3205C09}" type="datetimeFigureOut">
               <a:rPr lang="en-US" smtClean="0"/>
               <a:pPr/>
-              <a:t>12/10/2025</a:t>
+              <a:t>1/5/2026</a:t>
             </a:fld>
             <a:endParaRPr lang="en-US"/>
           </a:p>
@@ -1095,7 +1095,7 @@
             <a:fld id="{1D8BD707-D9CF-40AE-B4C6-C98DA3205C09}" type="datetimeFigureOut">
               <a:rPr lang="en-US" smtClean="0"/>
               <a:pPr/>
-              <a:t>12/10/2025</a:t>
+              <a:t>1/5/2026</a:t>
             </a:fld>
             <a:endParaRPr lang="en-US"/>
           </a:p>
@@ -1260,7 +1260,7 @@
             <a:fld id="{1D8BD707-D9CF-40AE-B4C6-C98DA3205C09}" type="datetimeFigureOut">
               <a:rPr lang="en-US" smtClean="0"/>
               <a:pPr/>
-              <a:t>12/10/2025</a:t>
+              <a:t>1/5/2026</a:t>
             </a:fld>
             <a:endParaRPr lang="en-US"/>
           </a:p>
@@ -1502,7 +1502,7 @@
             <a:fld id="{1D8BD707-D9CF-40AE-B4C6-C98DA3205C09}" type="datetimeFigureOut">
               <a:rPr lang="en-US" smtClean="0"/>
               <a:pPr/>
-              <a:t>12/10/2025</a:t>
+              <a:t>1/5/2026</a:t>
             </a:fld>
             <a:endParaRPr lang="en-US"/>
           </a:p>
@@ -1784,7 +1784,7 @@
             <a:fld id="{1D8BD707-D9CF-40AE-B4C6-C98DA3205C09}" type="datetimeFigureOut">
               <a:rPr lang="en-US" smtClean="0"/>
               <a:pPr/>
-              <a:t>12/10/2025</a:t>
+              <a:t>1/5/2026</a:t>
             </a:fld>
             <a:endParaRPr lang="en-US"/>
           </a:p>
@@ -2200,7 +2200,7 @@
             <a:fld id="{1D8BD707-D9CF-40AE-B4C6-C98DA3205C09}" type="datetimeFigureOut">
               <a:rPr lang="en-US" smtClean="0"/>
               <a:pPr/>
-              <a:t>12/10/2025</a:t>
+              <a:t>1/5/2026</a:t>
             </a:fld>
             <a:endParaRPr lang="en-US"/>
           </a:p>
@@ -2314,7 +2314,7 @@
             <a:fld id="{1D8BD707-D9CF-40AE-B4C6-C98DA3205C09}" type="datetimeFigureOut">
               <a:rPr lang="en-US" smtClean="0"/>
               <a:pPr/>
-              <a:t>12/10/2025</a:t>
+              <a:t>1/5/2026</a:t>
             </a:fld>
             <a:endParaRPr lang="en-US"/>
           </a:p>
@@ -2406,7 +2406,7 @@
             <a:fld id="{1D8BD707-D9CF-40AE-B4C6-C98DA3205C09}" type="datetimeFigureOut">
               <a:rPr lang="en-US" smtClean="0"/>
               <a:pPr/>
-              <a:t>12/10/2025</a:t>
+              <a:t>1/5/2026</a:t>
             </a:fld>
             <a:endParaRPr lang="en-US"/>
           </a:p>
@@ -2678,7 +2678,7 @@
             <a:fld id="{1D8BD707-D9CF-40AE-B4C6-C98DA3205C09}" type="datetimeFigureOut">
               <a:rPr lang="en-US" smtClean="0"/>
               <a:pPr/>
-              <a:t>12/10/2025</a:t>
+              <a:t>1/5/2026</a:t>
             </a:fld>
             <a:endParaRPr lang="en-US"/>
           </a:p>
@@ -2927,7 +2927,7 @@
             <a:fld id="{1D8BD707-D9CF-40AE-B4C6-C98DA3205C09}" type="datetimeFigureOut">
               <a:rPr lang="en-US" smtClean="0"/>
               <a:pPr/>
-              <a:t>12/10/2025</a:t>
+              <a:t>1/5/2026</a:t>
             </a:fld>
             <a:endParaRPr lang="en-US"/>
           </a:p>
@@ -3135,7 +3135,7 @@
             <a:fld id="{1D8BD707-D9CF-40AE-B4C6-C98DA3205C09}" type="datetimeFigureOut">
               <a:rPr lang="en-US" smtClean="0"/>
               <a:pPr/>
-              <a:t>12/10/2025</a:t>
+              <a:t>1/5/2026</a:t>
             </a:fld>
             <a:endParaRPr lang="en-US"/>
           </a:p>

</xml_diff>